<commit_message>
Continue with Operator's Guide
</commit_message>
<xml_diff>
--- a/Development/DocSources/en/Shared/_images/Containers.pptx
+++ b/Development/DocSources/en/Shared/_images/Containers.pptx
@@ -105,6 +105,11 @@
       </a:defRPr>
     </a:lvl9pPr>
   </p:defaultTextStyle>
+  <p:extLst>
+    <p:ext uri="{EFAFB233-063F-42B5-8137-9DF3F51BA10A}">
+      <p15:sldGuideLst xmlns:p15="http://schemas.microsoft.com/office/powerpoint/2012/main"/>
+    </p:ext>
+  </p:extLst>
 </p:presentation>
 </file>
 
@@ -239,7 +244,7 @@
           <a:p>
             <a:fld id="{0D6885AC-6F9D-4C4F-B990-FB8E98106C15}" type="datetimeFigureOut">
               <a:rPr lang="de-DE" smtClean="0"/>
-              <a:t>13.11.2017</a:t>
+              <a:t>28.11.2017</a:t>
             </a:fld>
             <a:endParaRPr lang="de-DE"/>
           </a:p>
@@ -409,7 +414,7 @@
           <a:p>
             <a:fld id="{0D6885AC-6F9D-4C4F-B990-FB8E98106C15}" type="datetimeFigureOut">
               <a:rPr lang="de-DE" smtClean="0"/>
-              <a:t>13.11.2017</a:t>
+              <a:t>28.11.2017</a:t>
             </a:fld>
             <a:endParaRPr lang="de-DE"/>
           </a:p>
@@ -589,7 +594,7 @@
           <a:p>
             <a:fld id="{0D6885AC-6F9D-4C4F-B990-FB8E98106C15}" type="datetimeFigureOut">
               <a:rPr lang="de-DE" smtClean="0"/>
-              <a:t>13.11.2017</a:t>
+              <a:t>28.11.2017</a:t>
             </a:fld>
             <a:endParaRPr lang="de-DE"/>
           </a:p>
@@ -759,7 +764,7 @@
           <a:p>
             <a:fld id="{0D6885AC-6F9D-4C4F-B990-FB8E98106C15}" type="datetimeFigureOut">
               <a:rPr lang="de-DE" smtClean="0"/>
-              <a:t>13.11.2017</a:t>
+              <a:t>28.11.2017</a:t>
             </a:fld>
             <a:endParaRPr lang="de-DE"/>
           </a:p>
@@ -1005,7 +1010,7 @@
           <a:p>
             <a:fld id="{0D6885AC-6F9D-4C4F-B990-FB8E98106C15}" type="datetimeFigureOut">
               <a:rPr lang="de-DE" smtClean="0"/>
-              <a:t>13.11.2017</a:t>
+              <a:t>28.11.2017</a:t>
             </a:fld>
             <a:endParaRPr lang="de-DE"/>
           </a:p>
@@ -1237,7 +1242,7 @@
           <a:p>
             <a:fld id="{0D6885AC-6F9D-4C4F-B990-FB8E98106C15}" type="datetimeFigureOut">
               <a:rPr lang="de-DE" smtClean="0"/>
-              <a:t>13.11.2017</a:t>
+              <a:t>28.11.2017</a:t>
             </a:fld>
             <a:endParaRPr lang="de-DE"/>
           </a:p>
@@ -1604,7 +1609,7 @@
           <a:p>
             <a:fld id="{0D6885AC-6F9D-4C4F-B990-FB8E98106C15}" type="datetimeFigureOut">
               <a:rPr lang="de-DE" smtClean="0"/>
-              <a:t>13.11.2017</a:t>
+              <a:t>28.11.2017</a:t>
             </a:fld>
             <a:endParaRPr lang="de-DE"/>
           </a:p>
@@ -1722,7 +1727,7 @@
           <a:p>
             <a:fld id="{0D6885AC-6F9D-4C4F-B990-FB8E98106C15}" type="datetimeFigureOut">
               <a:rPr lang="de-DE" smtClean="0"/>
-              <a:t>13.11.2017</a:t>
+              <a:t>28.11.2017</a:t>
             </a:fld>
             <a:endParaRPr lang="de-DE"/>
           </a:p>
@@ -1817,7 +1822,7 @@
           <a:p>
             <a:fld id="{0D6885AC-6F9D-4C4F-B990-FB8E98106C15}" type="datetimeFigureOut">
               <a:rPr lang="de-DE" smtClean="0"/>
-              <a:t>13.11.2017</a:t>
+              <a:t>28.11.2017</a:t>
             </a:fld>
             <a:endParaRPr lang="de-DE"/>
           </a:p>
@@ -2094,7 +2099,7 @@
           <a:p>
             <a:fld id="{0D6885AC-6F9D-4C4F-B990-FB8E98106C15}" type="datetimeFigureOut">
               <a:rPr lang="de-DE" smtClean="0"/>
-              <a:t>13.11.2017</a:t>
+              <a:t>28.11.2017</a:t>
             </a:fld>
             <a:endParaRPr lang="de-DE"/>
           </a:p>
@@ -2347,7 +2352,7 @@
           <a:p>
             <a:fld id="{0D6885AC-6F9D-4C4F-B990-FB8E98106C15}" type="datetimeFigureOut">
               <a:rPr lang="de-DE" smtClean="0"/>
-              <a:t>13.11.2017</a:t>
+              <a:t>28.11.2017</a:t>
             </a:fld>
             <a:endParaRPr lang="de-DE"/>
           </a:p>
@@ -2560,7 +2565,7 @@
           <a:p>
             <a:fld id="{0D6885AC-6F9D-4C4F-B990-FB8E98106C15}" type="datetimeFigureOut">
               <a:rPr lang="de-DE" smtClean="0"/>
-              <a:t>13.11.2017</a:t>
+              <a:t>28.11.2017</a:t>
             </a:fld>
             <a:endParaRPr lang="de-DE"/>
           </a:p>
@@ -2976,7 +2981,7 @@
         <p:spPr bwMode="auto">
           <a:xfrm>
             <a:off x="0" y="69850"/>
-            <a:ext cx="4495800" cy="2749550"/>
+            <a:ext cx="5705856" cy="2749550"/>
           </a:xfrm>
           <a:prstGeom prst="rect">
             <a:avLst/>
@@ -4524,7 +4529,7 @@
         </p:nvSpPr>
         <p:spPr bwMode="auto">
           <a:xfrm>
-            <a:off x="1793875" y="330200"/>
+            <a:off x="804863" y="297656"/>
             <a:ext cx="495300" cy="215900"/>
           </a:xfrm>
           <a:prstGeom prst="rect">
@@ -4659,7 +4664,7 @@
           <a:p>
             <a:pPr eaLnBrk="1" hangingPunct="1"/>
             <a:r>
-              <a:rPr lang="de-DE" altLang="de-DE" sz="800" b="1"/>
+              <a:rPr lang="de-DE" altLang="de-DE" sz="800" b="1" dirty="0"/>
               <a:t>http</a:t>
             </a:r>
           </a:p>
@@ -4675,7 +4680,7 @@
         </p:nvSpPr>
         <p:spPr bwMode="auto">
           <a:xfrm>
-            <a:off x="1416050" y="658813"/>
+            <a:off x="876300" y="632222"/>
             <a:ext cx="495300" cy="215900"/>
           </a:xfrm>
           <a:prstGeom prst="rect">
@@ -4810,7 +4815,7 @@
           <a:p>
             <a:pPr eaLnBrk="1" hangingPunct="1"/>
             <a:r>
-              <a:rPr lang="de-DE" altLang="de-DE" sz="800" b="1"/>
+              <a:rPr lang="de-DE" altLang="de-DE" sz="800" b="1" dirty="0"/>
               <a:t>http</a:t>
             </a:r>
           </a:p>
@@ -5537,6 +5542,907 @@
             </a:ext>
           </a:extLst>
         </p:spPr>
+      </p:cxnSp>
+      <p:sp>
+        <p:nvSpPr>
+          <p:cNvPr id="29" name="AutoShape 59"/>
+          <p:cNvSpPr>
+            <a:spLocks noChangeArrowheads="1"/>
+          </p:cNvSpPr>
+          <p:nvPr/>
+        </p:nvSpPr>
+        <p:spPr bwMode="auto">
+          <a:xfrm>
+            <a:off x="3468624" y="607218"/>
+            <a:ext cx="914400" cy="531813"/>
+          </a:xfrm>
+          <a:prstGeom prst="roundRect">
+            <a:avLst>
+              <a:gd name="adj" fmla="val 16667"/>
+            </a:avLst>
+          </a:prstGeom>
+          <a:solidFill>
+            <a:srgbClr val="C0C0C0"/>
+          </a:solidFill>
+          <a:ln w="9525">
+            <a:solidFill>
+              <a:schemeClr val="tx1"/>
+            </a:solidFill>
+            <a:prstDash val="dash"/>
+            <a:round/>
+            <a:headEnd/>
+            <a:tailEnd/>
+          </a:ln>
+          <a:effectLst/>
+          <a:extLst>
+            <a:ext uri="{AF507438-7753-43E0-B8FC-AC1667EBCBE1}">
+              <a14:hiddenEffects xmlns:a14="http://schemas.microsoft.com/office/drawing/2010/main">
+                <a:effectLst>
+                  <a:outerShdw dist="35921" dir="2700000" algn="ctr" rotWithShape="0">
+                    <a:schemeClr val="bg2"/>
+                  </a:outerShdw>
+                </a:effectLst>
+              </a14:hiddenEffects>
+            </a:ext>
+          </a:extLst>
+        </p:spPr>
+        <p:txBody>
+          <a:bodyPr wrap="none" anchor="ctr"/>
+          <a:lstStyle>
+            <a:lvl1pPr>
+              <a:spcBef>
+                <a:spcPct val="20000"/>
+              </a:spcBef>
+              <a:buChar char="•"/>
+              <a:defRPr sz="1700">
+                <a:solidFill>
+                  <a:schemeClr val="tx1"/>
+                </a:solidFill>
+                <a:latin typeface="Arial" panose="020B0604020202020204" pitchFamily="34" charset="0"/>
+              </a:defRPr>
+            </a:lvl1pPr>
+            <a:lvl2pPr marL="742950" indent="-285750">
+              <a:spcBef>
+                <a:spcPct val="20000"/>
+              </a:spcBef>
+              <a:buChar char="–"/>
+              <a:defRPr sz="1500">
+                <a:solidFill>
+                  <a:schemeClr val="tx1"/>
+                </a:solidFill>
+                <a:latin typeface="Arial" panose="020B0604020202020204" pitchFamily="34" charset="0"/>
+              </a:defRPr>
+            </a:lvl2pPr>
+            <a:lvl3pPr marL="1143000" indent="-228600">
+              <a:spcBef>
+                <a:spcPct val="20000"/>
+              </a:spcBef>
+              <a:buChar char="•"/>
+              <a:defRPr sz="1300">
+                <a:solidFill>
+                  <a:schemeClr val="tx1"/>
+                </a:solidFill>
+                <a:latin typeface="Arial" panose="020B0604020202020204" pitchFamily="34" charset="0"/>
+              </a:defRPr>
+            </a:lvl3pPr>
+            <a:lvl4pPr marL="1600200" indent="-228600">
+              <a:spcBef>
+                <a:spcPct val="20000"/>
+              </a:spcBef>
+              <a:buChar char="–"/>
+              <a:defRPr sz="1100">
+                <a:solidFill>
+                  <a:schemeClr val="tx1"/>
+                </a:solidFill>
+                <a:latin typeface="Arial" panose="020B0604020202020204" pitchFamily="34" charset="0"/>
+              </a:defRPr>
+            </a:lvl4pPr>
+            <a:lvl5pPr marL="2057400" indent="-228600">
+              <a:spcBef>
+                <a:spcPct val="20000"/>
+              </a:spcBef>
+              <a:buChar char="»"/>
+              <a:defRPr sz="1100">
+                <a:solidFill>
+                  <a:schemeClr val="tx1"/>
+                </a:solidFill>
+                <a:latin typeface="Arial" panose="020B0604020202020204" pitchFamily="34" charset="0"/>
+              </a:defRPr>
+            </a:lvl5pPr>
+            <a:lvl6pPr marL="2514600" indent="-228600" eaLnBrk="0" fontAlgn="base" hangingPunct="0">
+              <a:spcBef>
+                <a:spcPct val="20000"/>
+              </a:spcBef>
+              <a:spcAft>
+                <a:spcPct val="0"/>
+              </a:spcAft>
+              <a:buChar char="»"/>
+              <a:defRPr sz="1100">
+                <a:solidFill>
+                  <a:schemeClr val="tx1"/>
+                </a:solidFill>
+                <a:latin typeface="Arial" panose="020B0604020202020204" pitchFamily="34" charset="0"/>
+              </a:defRPr>
+            </a:lvl6pPr>
+            <a:lvl7pPr marL="2971800" indent="-228600" eaLnBrk="0" fontAlgn="base" hangingPunct="0">
+              <a:spcBef>
+                <a:spcPct val="20000"/>
+              </a:spcBef>
+              <a:spcAft>
+                <a:spcPct val="0"/>
+              </a:spcAft>
+              <a:buChar char="»"/>
+              <a:defRPr sz="1100">
+                <a:solidFill>
+                  <a:schemeClr val="tx1"/>
+                </a:solidFill>
+                <a:latin typeface="Arial" panose="020B0604020202020204" pitchFamily="34" charset="0"/>
+              </a:defRPr>
+            </a:lvl7pPr>
+            <a:lvl8pPr marL="3429000" indent="-228600" eaLnBrk="0" fontAlgn="base" hangingPunct="0">
+              <a:spcBef>
+                <a:spcPct val="20000"/>
+              </a:spcBef>
+              <a:spcAft>
+                <a:spcPct val="0"/>
+              </a:spcAft>
+              <a:buChar char="»"/>
+              <a:defRPr sz="1100">
+                <a:solidFill>
+                  <a:schemeClr val="tx1"/>
+                </a:solidFill>
+                <a:latin typeface="Arial" panose="020B0604020202020204" pitchFamily="34" charset="0"/>
+              </a:defRPr>
+            </a:lvl8pPr>
+            <a:lvl9pPr marL="3886200" indent="-228600" eaLnBrk="0" fontAlgn="base" hangingPunct="0">
+              <a:spcBef>
+                <a:spcPct val="20000"/>
+              </a:spcBef>
+              <a:spcAft>
+                <a:spcPct val="0"/>
+              </a:spcAft>
+              <a:buChar char="»"/>
+              <a:defRPr sz="1100">
+                <a:solidFill>
+                  <a:schemeClr val="tx1"/>
+                </a:solidFill>
+                <a:latin typeface="Arial" panose="020B0604020202020204" pitchFamily="34" charset="0"/>
+              </a:defRPr>
+            </a:lvl9pPr>
+          </a:lstStyle>
+          <a:p>
+            <a:pPr eaLnBrk="1" hangingPunct="1">
+              <a:spcBef>
+                <a:spcPct val="0"/>
+              </a:spcBef>
+              <a:buFontTx/>
+              <a:buNone/>
+            </a:pPr>
+            <a:r>
+              <a:rPr lang="de-DE" altLang="de-DE" sz="800" b="1" dirty="0" err="1" smtClean="0"/>
+              <a:t>oscm-help</a:t>
+            </a:r>
+            <a:endParaRPr lang="en-US" altLang="de-DE" sz="800" dirty="0"/>
+          </a:p>
+        </p:txBody>
+      </p:sp>
+      <p:sp>
+        <p:nvSpPr>
+          <p:cNvPr id="30" name="Rectangle 29"/>
+          <p:cNvSpPr/>
+          <p:nvPr/>
+        </p:nvSpPr>
+        <p:spPr bwMode="auto">
+          <a:xfrm>
+            <a:off x="3621024" y="1064418"/>
+            <a:ext cx="669925" cy="379413"/>
+          </a:xfrm>
+          <a:prstGeom prst="rect">
+            <a:avLst/>
+          </a:prstGeom>
+          <a:solidFill>
+            <a:schemeClr val="accent3"/>
+          </a:solidFill>
+          <a:ln w="9525" cap="flat" cmpd="sng" algn="ctr">
+            <a:solidFill>
+              <a:schemeClr val="tx1"/>
+            </a:solidFill>
+            <a:prstDash val="solid"/>
+            <a:round/>
+            <a:headEnd type="none" w="med" len="med"/>
+            <a:tailEnd type="none" w="med" len="med"/>
+          </a:ln>
+          <a:effectLst/>
+          <a:extLst/>
+        </p:spPr>
+        <p:txBody>
+          <a:bodyPr/>
+          <a:lstStyle/>
+          <a:p>
+            <a:pPr eaLnBrk="1" hangingPunct="1">
+              <a:defRPr/>
+            </a:pPr>
+            <a:r>
+              <a:rPr lang="de-DE" altLang="de-DE" sz="800" b="1" dirty="0"/>
+              <a:t>FQDN / IP</a:t>
+            </a:r>
+          </a:p>
+          <a:p>
+            <a:pPr eaLnBrk="1" hangingPunct="1">
+              <a:defRPr/>
+            </a:pPr>
+            <a:endParaRPr lang="de-DE" altLang="de-DE" sz="800" b="1" dirty="0"/>
+          </a:p>
+        </p:txBody>
+      </p:sp>
+      <p:cxnSp>
+        <p:nvCxnSpPr>
+          <p:cNvPr id="3" name="Straight Connector 2"/>
+          <p:cNvCxnSpPr>
+            <a:stCxn id="30" idx="2"/>
+            <a:endCxn id="8" idx="0"/>
+          </p:cNvCxnSpPr>
+          <p:nvPr/>
+        </p:nvCxnSpPr>
+        <p:spPr>
+          <a:xfrm>
+            <a:off x="3955987" y="1443831"/>
+            <a:ext cx="6413" cy="232569"/>
+          </a:xfrm>
+          <a:prstGeom prst="line">
+            <a:avLst/>
+          </a:prstGeom>
+        </p:spPr>
+        <p:style>
+          <a:lnRef idx="1">
+            <a:schemeClr val="accent1"/>
+          </a:lnRef>
+          <a:fillRef idx="0">
+            <a:schemeClr val="accent1"/>
+          </a:fillRef>
+          <a:effectRef idx="0">
+            <a:schemeClr val="accent1"/>
+          </a:effectRef>
+          <a:fontRef idx="minor">
+            <a:schemeClr val="tx1"/>
+          </a:fontRef>
+        </p:style>
+      </p:cxnSp>
+      <p:sp>
+        <p:nvSpPr>
+          <p:cNvPr id="31" name="AutoShape 59"/>
+          <p:cNvSpPr>
+            <a:spLocks noChangeArrowheads="1"/>
+          </p:cNvSpPr>
+          <p:nvPr/>
+        </p:nvSpPr>
+        <p:spPr bwMode="auto">
+          <a:xfrm>
+            <a:off x="4692078" y="1661826"/>
+            <a:ext cx="890587" cy="531813"/>
+          </a:xfrm>
+          <a:prstGeom prst="roundRect">
+            <a:avLst>
+              <a:gd name="adj" fmla="val 16667"/>
+            </a:avLst>
+          </a:prstGeom>
+          <a:solidFill>
+            <a:srgbClr val="C0C0C0"/>
+          </a:solidFill>
+          <a:ln w="9525">
+            <a:solidFill>
+              <a:schemeClr val="tx1"/>
+            </a:solidFill>
+            <a:prstDash val="dash"/>
+            <a:round/>
+            <a:headEnd/>
+            <a:tailEnd/>
+          </a:ln>
+          <a:effectLst/>
+          <a:extLst>
+            <a:ext uri="{AF507438-7753-43E0-B8FC-AC1667EBCBE1}">
+              <a14:hiddenEffects xmlns:a14="http://schemas.microsoft.com/office/drawing/2010/main">
+                <a:effectLst>
+                  <a:outerShdw dist="35921" dir="2700000" algn="ctr" rotWithShape="0">
+                    <a:schemeClr val="bg2"/>
+                  </a:outerShdw>
+                </a:effectLst>
+              </a14:hiddenEffects>
+            </a:ext>
+          </a:extLst>
+        </p:spPr>
+        <p:txBody>
+          <a:bodyPr wrap="none" anchor="ctr"/>
+          <a:lstStyle>
+            <a:lvl1pPr>
+              <a:spcBef>
+                <a:spcPct val="20000"/>
+              </a:spcBef>
+              <a:buChar char="•"/>
+              <a:defRPr sz="1700">
+                <a:solidFill>
+                  <a:schemeClr val="tx1"/>
+                </a:solidFill>
+                <a:latin typeface="Arial" panose="020B0604020202020204" pitchFamily="34" charset="0"/>
+              </a:defRPr>
+            </a:lvl1pPr>
+            <a:lvl2pPr marL="742950" indent="-285750">
+              <a:spcBef>
+                <a:spcPct val="20000"/>
+              </a:spcBef>
+              <a:buChar char="–"/>
+              <a:defRPr sz="1500">
+                <a:solidFill>
+                  <a:schemeClr val="tx1"/>
+                </a:solidFill>
+                <a:latin typeface="Arial" panose="020B0604020202020204" pitchFamily="34" charset="0"/>
+              </a:defRPr>
+            </a:lvl2pPr>
+            <a:lvl3pPr marL="1143000" indent="-228600">
+              <a:spcBef>
+                <a:spcPct val="20000"/>
+              </a:spcBef>
+              <a:buChar char="•"/>
+              <a:defRPr sz="1300">
+                <a:solidFill>
+                  <a:schemeClr val="tx1"/>
+                </a:solidFill>
+                <a:latin typeface="Arial" panose="020B0604020202020204" pitchFamily="34" charset="0"/>
+              </a:defRPr>
+            </a:lvl3pPr>
+            <a:lvl4pPr marL="1600200" indent="-228600">
+              <a:spcBef>
+                <a:spcPct val="20000"/>
+              </a:spcBef>
+              <a:buChar char="–"/>
+              <a:defRPr sz="1100">
+                <a:solidFill>
+                  <a:schemeClr val="tx1"/>
+                </a:solidFill>
+                <a:latin typeface="Arial" panose="020B0604020202020204" pitchFamily="34" charset="0"/>
+              </a:defRPr>
+            </a:lvl4pPr>
+            <a:lvl5pPr marL="2057400" indent="-228600">
+              <a:spcBef>
+                <a:spcPct val="20000"/>
+              </a:spcBef>
+              <a:buChar char="»"/>
+              <a:defRPr sz="1100">
+                <a:solidFill>
+                  <a:schemeClr val="tx1"/>
+                </a:solidFill>
+                <a:latin typeface="Arial" panose="020B0604020202020204" pitchFamily="34" charset="0"/>
+              </a:defRPr>
+            </a:lvl5pPr>
+            <a:lvl6pPr marL="2514600" indent="-228600" eaLnBrk="0" fontAlgn="base" hangingPunct="0">
+              <a:spcBef>
+                <a:spcPct val="20000"/>
+              </a:spcBef>
+              <a:spcAft>
+                <a:spcPct val="0"/>
+              </a:spcAft>
+              <a:buChar char="»"/>
+              <a:defRPr sz="1100">
+                <a:solidFill>
+                  <a:schemeClr val="tx1"/>
+                </a:solidFill>
+                <a:latin typeface="Arial" panose="020B0604020202020204" pitchFamily="34" charset="0"/>
+              </a:defRPr>
+            </a:lvl6pPr>
+            <a:lvl7pPr marL="2971800" indent="-228600" eaLnBrk="0" fontAlgn="base" hangingPunct="0">
+              <a:spcBef>
+                <a:spcPct val="20000"/>
+              </a:spcBef>
+              <a:spcAft>
+                <a:spcPct val="0"/>
+              </a:spcAft>
+              <a:buChar char="»"/>
+              <a:defRPr sz="1100">
+                <a:solidFill>
+                  <a:schemeClr val="tx1"/>
+                </a:solidFill>
+                <a:latin typeface="Arial" panose="020B0604020202020204" pitchFamily="34" charset="0"/>
+              </a:defRPr>
+            </a:lvl7pPr>
+            <a:lvl8pPr marL="3429000" indent="-228600" eaLnBrk="0" fontAlgn="base" hangingPunct="0">
+              <a:spcBef>
+                <a:spcPct val="20000"/>
+              </a:spcBef>
+              <a:spcAft>
+                <a:spcPct val="0"/>
+              </a:spcAft>
+              <a:buChar char="»"/>
+              <a:defRPr sz="1100">
+                <a:solidFill>
+                  <a:schemeClr val="tx1"/>
+                </a:solidFill>
+                <a:latin typeface="Arial" panose="020B0604020202020204" pitchFamily="34" charset="0"/>
+              </a:defRPr>
+            </a:lvl8pPr>
+            <a:lvl9pPr marL="3886200" indent="-228600" eaLnBrk="0" fontAlgn="base" hangingPunct="0">
+              <a:spcBef>
+                <a:spcPct val="20000"/>
+              </a:spcBef>
+              <a:spcAft>
+                <a:spcPct val="0"/>
+              </a:spcAft>
+              <a:buChar char="»"/>
+              <a:defRPr sz="1100">
+                <a:solidFill>
+                  <a:schemeClr val="tx1"/>
+                </a:solidFill>
+                <a:latin typeface="Arial" panose="020B0604020202020204" pitchFamily="34" charset="0"/>
+              </a:defRPr>
+            </a:lvl9pPr>
+          </a:lstStyle>
+          <a:p>
+            <a:pPr eaLnBrk="1" hangingPunct="1">
+              <a:spcBef>
+                <a:spcPct val="0"/>
+              </a:spcBef>
+              <a:buFontTx/>
+              <a:buNone/>
+            </a:pPr>
+            <a:r>
+              <a:rPr lang="de-DE" altLang="de-DE" sz="800" b="1" dirty="0" err="1" smtClean="0"/>
+              <a:t>oscm-db</a:t>
+            </a:r>
+            <a:endParaRPr lang="en-US" altLang="de-DE" sz="800" dirty="0"/>
+          </a:p>
+        </p:txBody>
+      </p:sp>
+      <p:sp>
+        <p:nvSpPr>
+          <p:cNvPr id="32" name="Rectangle 31"/>
+          <p:cNvSpPr/>
+          <p:nvPr/>
+        </p:nvSpPr>
+        <p:spPr bwMode="auto">
+          <a:xfrm>
+            <a:off x="4785360" y="2055527"/>
+            <a:ext cx="669925" cy="379413"/>
+          </a:xfrm>
+          <a:prstGeom prst="rect">
+            <a:avLst/>
+          </a:prstGeom>
+          <a:solidFill>
+            <a:schemeClr val="accent3"/>
+          </a:solidFill>
+          <a:ln w="9525" cap="flat" cmpd="sng" algn="ctr">
+            <a:solidFill>
+              <a:schemeClr val="tx1"/>
+            </a:solidFill>
+            <a:prstDash val="solid"/>
+            <a:round/>
+            <a:headEnd type="none" w="med" len="med"/>
+            <a:tailEnd type="none" w="med" len="med"/>
+          </a:ln>
+          <a:effectLst/>
+          <a:extLst/>
+        </p:spPr>
+        <p:txBody>
+          <a:bodyPr/>
+          <a:lstStyle/>
+          <a:p>
+            <a:pPr eaLnBrk="1" hangingPunct="1">
+              <a:defRPr/>
+            </a:pPr>
+            <a:r>
+              <a:rPr lang="de-DE" altLang="de-DE" sz="800" b="1" dirty="0"/>
+              <a:t>FQDN / IP</a:t>
+            </a:r>
+          </a:p>
+          <a:p>
+            <a:pPr eaLnBrk="1" hangingPunct="1">
+              <a:defRPr/>
+            </a:pPr>
+            <a:endParaRPr lang="de-DE" altLang="de-DE" sz="800" b="1" dirty="0"/>
+          </a:p>
+        </p:txBody>
+      </p:sp>
+      <p:sp>
+        <p:nvSpPr>
+          <p:cNvPr id="33" name="Can 32"/>
+          <p:cNvSpPr/>
+          <p:nvPr/>
+        </p:nvSpPr>
+        <p:spPr>
+          <a:xfrm>
+            <a:off x="4826000" y="2894839"/>
+            <a:ext cx="619125" cy="571500"/>
+          </a:xfrm>
+          <a:prstGeom prst="can">
+            <a:avLst/>
+          </a:prstGeom>
+          <a:noFill/>
+        </p:spPr>
+        <p:style>
+          <a:lnRef idx="2">
+            <a:schemeClr val="accent1">
+              <a:shade val="50000"/>
+            </a:schemeClr>
+          </a:lnRef>
+          <a:fillRef idx="1">
+            <a:schemeClr val="accent1"/>
+          </a:fillRef>
+          <a:effectRef idx="0">
+            <a:schemeClr val="accent1"/>
+          </a:effectRef>
+          <a:fontRef idx="minor">
+            <a:schemeClr val="lt1"/>
+          </a:fontRef>
+        </p:style>
+        <p:txBody>
+          <a:bodyPr rtlCol="0" anchor="ctr"/>
+          <a:lstStyle/>
+          <a:p>
+            <a:pPr algn="ctr"/>
+            <a:endParaRPr lang="de-DE"/>
+          </a:p>
+        </p:txBody>
+      </p:sp>
+      <p:sp>
+        <p:nvSpPr>
+          <p:cNvPr id="34" name="Rectangle 33"/>
+          <p:cNvSpPr/>
+          <p:nvPr/>
+        </p:nvSpPr>
+        <p:spPr>
+          <a:xfrm>
+            <a:off x="4836068" y="3111557"/>
+            <a:ext cx="591829" cy="246221"/>
+          </a:xfrm>
+          <a:prstGeom prst="rect">
+            <a:avLst/>
+          </a:prstGeom>
+        </p:spPr>
+        <p:txBody>
+          <a:bodyPr wrap="none">
+            <a:spAutoFit/>
+          </a:bodyPr>
+          <a:lstStyle/>
+          <a:p>
+            <a:pPr algn="ctr">
+              <a:spcBef>
+                <a:spcPct val="0"/>
+              </a:spcBef>
+            </a:pPr>
+            <a:r>
+              <a:rPr lang="de-DE" altLang="de-DE" sz="1000" b="1" dirty="0" smtClean="0"/>
+              <a:t>Storage</a:t>
+            </a:r>
+            <a:endParaRPr lang="en-US" altLang="de-DE" sz="1000" dirty="0"/>
+          </a:p>
+        </p:txBody>
+      </p:sp>
+      <p:cxnSp>
+        <p:nvCxnSpPr>
+          <p:cNvPr id="37" name="Straight Arrow Connector 36"/>
+          <p:cNvCxnSpPr>
+            <a:stCxn id="32" idx="2"/>
+            <a:endCxn id="33" idx="1"/>
+          </p:cNvCxnSpPr>
+          <p:nvPr/>
+        </p:nvCxnSpPr>
+        <p:spPr>
+          <a:xfrm>
+            <a:off x="5120323" y="2434940"/>
+            <a:ext cx="15240" cy="459899"/>
+          </a:xfrm>
+          <a:prstGeom prst="straightConnector1">
+            <a:avLst/>
+          </a:prstGeom>
+          <a:ln>
+            <a:tailEnd type="triangle"/>
+          </a:ln>
+        </p:spPr>
+        <p:style>
+          <a:lnRef idx="1">
+            <a:schemeClr val="accent1"/>
+          </a:lnRef>
+          <a:fillRef idx="0">
+            <a:schemeClr val="accent1"/>
+          </a:fillRef>
+          <a:effectRef idx="0">
+            <a:schemeClr val="accent1"/>
+          </a:effectRef>
+          <a:fontRef idx="minor">
+            <a:schemeClr val="tx1"/>
+          </a:fontRef>
+        </p:style>
+      </p:cxnSp>
+      <p:cxnSp>
+        <p:nvCxnSpPr>
+          <p:cNvPr id="41" name="Straight Connector 40"/>
+          <p:cNvCxnSpPr>
+            <a:stCxn id="16" idx="2"/>
+          </p:cNvCxnSpPr>
+          <p:nvPr/>
+        </p:nvCxnSpPr>
+        <p:spPr>
+          <a:xfrm>
+            <a:off x="819150" y="315913"/>
+            <a:ext cx="4228338" cy="0"/>
+          </a:xfrm>
+          <a:prstGeom prst="line">
+            <a:avLst/>
+          </a:prstGeom>
+        </p:spPr>
+        <p:style>
+          <a:lnRef idx="1">
+            <a:schemeClr val="accent1"/>
+          </a:lnRef>
+          <a:fillRef idx="0">
+            <a:schemeClr val="accent1"/>
+          </a:fillRef>
+          <a:effectRef idx="0">
+            <a:schemeClr val="accent1"/>
+          </a:effectRef>
+          <a:fontRef idx="minor">
+            <a:schemeClr val="tx1"/>
+          </a:fontRef>
+        </p:style>
+      </p:cxnSp>
+      <p:cxnSp>
+        <p:nvCxnSpPr>
+          <p:cNvPr id="43" name="Straight Arrow Connector 42"/>
+          <p:cNvCxnSpPr/>
+          <p:nvPr/>
+        </p:nvCxnSpPr>
+        <p:spPr>
+          <a:xfrm>
+            <a:off x="5047488" y="330200"/>
+            <a:ext cx="0" cy="1331626"/>
+          </a:xfrm>
+          <a:prstGeom prst="straightConnector1">
+            <a:avLst/>
+          </a:prstGeom>
+          <a:ln>
+            <a:tailEnd type="triangle"/>
+          </a:ln>
+        </p:spPr>
+        <p:style>
+          <a:lnRef idx="1">
+            <a:schemeClr val="accent1"/>
+          </a:lnRef>
+          <a:fillRef idx="0">
+            <a:schemeClr val="accent1"/>
+          </a:fillRef>
+          <a:effectRef idx="0">
+            <a:schemeClr val="accent1"/>
+          </a:effectRef>
+          <a:fontRef idx="minor">
+            <a:schemeClr val="tx1"/>
+          </a:fontRef>
+        </p:style>
+      </p:cxnSp>
+      <p:cxnSp>
+        <p:nvCxnSpPr>
+          <p:cNvPr id="47" name="Straight Arrow Connector 46"/>
+          <p:cNvCxnSpPr>
+            <a:stCxn id="16" idx="2"/>
+          </p:cNvCxnSpPr>
+          <p:nvPr/>
+        </p:nvCxnSpPr>
+        <p:spPr>
+          <a:xfrm>
+            <a:off x="819150" y="315913"/>
+            <a:ext cx="0" cy="1066800"/>
+          </a:xfrm>
+          <a:prstGeom prst="straightConnector1">
+            <a:avLst/>
+          </a:prstGeom>
+          <a:ln>
+            <a:tailEnd type="triangle"/>
+          </a:ln>
+        </p:spPr>
+        <p:style>
+          <a:lnRef idx="1">
+            <a:schemeClr val="accent1"/>
+          </a:lnRef>
+          <a:fillRef idx="0">
+            <a:schemeClr val="accent1"/>
+          </a:fillRef>
+          <a:effectRef idx="0">
+            <a:schemeClr val="accent1"/>
+          </a:effectRef>
+          <a:fontRef idx="minor">
+            <a:schemeClr val="tx1"/>
+          </a:fontRef>
+        </p:style>
+      </p:cxnSp>
+      <p:cxnSp>
+        <p:nvCxnSpPr>
+          <p:cNvPr id="53" name="Straight Arrow Connector 52"/>
+          <p:cNvCxnSpPr>
+            <a:endCxn id="11" idx="0"/>
+          </p:cNvCxnSpPr>
+          <p:nvPr/>
+        </p:nvCxnSpPr>
+        <p:spPr>
+          <a:xfrm>
+            <a:off x="1695624" y="405606"/>
+            <a:ext cx="10939" cy="965994"/>
+          </a:xfrm>
+          <a:prstGeom prst="straightConnector1">
+            <a:avLst/>
+          </a:prstGeom>
+          <a:ln>
+            <a:tailEnd type="triangle"/>
+          </a:ln>
+        </p:spPr>
+        <p:style>
+          <a:lnRef idx="1">
+            <a:schemeClr val="accent1"/>
+          </a:lnRef>
+          <a:fillRef idx="0">
+            <a:schemeClr val="accent1"/>
+          </a:fillRef>
+          <a:effectRef idx="0">
+            <a:schemeClr val="accent1"/>
+          </a:effectRef>
+          <a:fontRef idx="minor">
+            <a:schemeClr val="tx1"/>
+          </a:fontRef>
+        </p:style>
+      </p:cxnSp>
+      <p:cxnSp>
+        <p:nvCxnSpPr>
+          <p:cNvPr id="57" name="Straight Connector 56"/>
+          <p:cNvCxnSpPr/>
+          <p:nvPr/>
+        </p:nvCxnSpPr>
+        <p:spPr>
+          <a:xfrm>
+            <a:off x="1695624" y="405606"/>
+            <a:ext cx="3439938" cy="0"/>
+          </a:xfrm>
+          <a:prstGeom prst="line">
+            <a:avLst/>
+          </a:prstGeom>
+        </p:spPr>
+        <p:style>
+          <a:lnRef idx="1">
+            <a:schemeClr val="accent1"/>
+          </a:lnRef>
+          <a:fillRef idx="0">
+            <a:schemeClr val="accent1"/>
+          </a:fillRef>
+          <a:effectRef idx="0">
+            <a:schemeClr val="accent1"/>
+          </a:effectRef>
+          <a:fontRef idx="minor">
+            <a:schemeClr val="tx1"/>
+          </a:fontRef>
+        </p:style>
+      </p:cxnSp>
+      <p:cxnSp>
+        <p:nvCxnSpPr>
+          <p:cNvPr id="59" name="Straight Arrow Connector 58"/>
+          <p:cNvCxnSpPr>
+            <a:endCxn id="31" idx="0"/>
+          </p:cNvCxnSpPr>
+          <p:nvPr/>
+        </p:nvCxnSpPr>
+        <p:spPr>
+          <a:xfrm>
+            <a:off x="5135562" y="405606"/>
+            <a:ext cx="1810" cy="1256220"/>
+          </a:xfrm>
+          <a:prstGeom prst="straightConnector1">
+            <a:avLst/>
+          </a:prstGeom>
+          <a:ln>
+            <a:tailEnd type="triangle"/>
+          </a:ln>
+        </p:spPr>
+        <p:style>
+          <a:lnRef idx="1">
+            <a:schemeClr val="accent1"/>
+          </a:lnRef>
+          <a:fillRef idx="0">
+            <a:schemeClr val="accent1"/>
+          </a:fillRef>
+          <a:effectRef idx="0">
+            <a:schemeClr val="accent1"/>
+          </a:effectRef>
+          <a:fontRef idx="minor">
+            <a:schemeClr val="tx1"/>
+          </a:fontRef>
+        </p:style>
+      </p:cxnSp>
+      <p:cxnSp>
+        <p:nvCxnSpPr>
+          <p:cNvPr id="62" name="Straight Connector 61"/>
+          <p:cNvCxnSpPr/>
+          <p:nvPr/>
+        </p:nvCxnSpPr>
+        <p:spPr>
+          <a:xfrm>
+            <a:off x="2933319" y="513556"/>
+            <a:ext cx="0" cy="848518"/>
+          </a:xfrm>
+          <a:prstGeom prst="line">
+            <a:avLst/>
+          </a:prstGeom>
+        </p:spPr>
+        <p:style>
+          <a:lnRef idx="1">
+            <a:schemeClr val="accent1"/>
+          </a:lnRef>
+          <a:fillRef idx="0">
+            <a:schemeClr val="accent1"/>
+          </a:fillRef>
+          <a:effectRef idx="0">
+            <a:schemeClr val="accent1"/>
+          </a:effectRef>
+          <a:fontRef idx="minor">
+            <a:schemeClr val="tx1"/>
+          </a:fontRef>
+        </p:style>
+      </p:cxnSp>
+      <p:cxnSp>
+        <p:nvCxnSpPr>
+          <p:cNvPr id="64" name="Straight Connector 63"/>
+          <p:cNvCxnSpPr/>
+          <p:nvPr/>
+        </p:nvCxnSpPr>
+        <p:spPr>
+          <a:xfrm>
+            <a:off x="2933319" y="513556"/>
+            <a:ext cx="2370201" cy="0"/>
+          </a:xfrm>
+          <a:prstGeom prst="line">
+            <a:avLst/>
+          </a:prstGeom>
+        </p:spPr>
+        <p:style>
+          <a:lnRef idx="1">
+            <a:schemeClr val="accent1"/>
+          </a:lnRef>
+          <a:fillRef idx="0">
+            <a:schemeClr val="accent1"/>
+          </a:fillRef>
+          <a:effectRef idx="0">
+            <a:schemeClr val="accent1"/>
+          </a:effectRef>
+          <a:fontRef idx="minor">
+            <a:schemeClr val="tx1"/>
+          </a:fontRef>
+        </p:style>
+      </p:cxnSp>
+      <p:cxnSp>
+        <p:nvCxnSpPr>
+          <p:cNvPr id="66" name="Straight Arrow Connector 65"/>
+          <p:cNvCxnSpPr/>
+          <p:nvPr/>
+        </p:nvCxnSpPr>
+        <p:spPr>
+          <a:xfrm>
+            <a:off x="5294376" y="513556"/>
+            <a:ext cx="9144" cy="1148270"/>
+          </a:xfrm>
+          <a:prstGeom prst="straightConnector1">
+            <a:avLst/>
+          </a:prstGeom>
+          <a:ln>
+            <a:tailEnd type="triangle"/>
+          </a:ln>
+        </p:spPr>
+        <p:style>
+          <a:lnRef idx="1">
+            <a:schemeClr val="accent1"/>
+          </a:lnRef>
+          <a:fillRef idx="0">
+            <a:schemeClr val="accent1"/>
+          </a:fillRef>
+          <a:effectRef idx="0">
+            <a:schemeClr val="accent1"/>
+          </a:effectRef>
+          <a:fontRef idx="minor">
+            <a:schemeClr val="tx1"/>
+          </a:fontRef>
+        </p:style>
       </p:cxnSp>
     </p:spTree>
     <p:extLst>
@@ -5578,8 +6484,8 @@
         </p:nvSpPr>
         <p:spPr bwMode="auto">
           <a:xfrm>
-            <a:off x="187287" y="668730"/>
-            <a:ext cx="6051588" cy="1531545"/>
+            <a:off x="187287" y="246888"/>
+            <a:ext cx="6051588" cy="1953387"/>
           </a:xfrm>
           <a:prstGeom prst="rect">
             <a:avLst/>
@@ -6452,7 +7358,7 @@
         </p:nvSpPr>
         <p:spPr bwMode="auto">
           <a:xfrm>
-            <a:off x="263787" y="668730"/>
+            <a:off x="263787" y="339546"/>
             <a:ext cx="1447800" cy="246063"/>
           </a:xfrm>
           <a:prstGeom prst="rect">
@@ -7637,6 +8543,415 @@
           </a:p>
         </p:txBody>
       </p:sp>
+      <p:sp>
+        <p:nvSpPr>
+          <p:cNvPr id="27" name="AutoShape 59"/>
+          <p:cNvSpPr>
+            <a:spLocks noChangeArrowheads="1"/>
+          </p:cNvSpPr>
+          <p:nvPr/>
+        </p:nvSpPr>
+        <p:spPr bwMode="auto">
+          <a:xfrm>
+            <a:off x="2791605" y="256804"/>
+            <a:ext cx="890587" cy="531813"/>
+          </a:xfrm>
+          <a:prstGeom prst="roundRect">
+            <a:avLst>
+              <a:gd name="adj" fmla="val 16667"/>
+            </a:avLst>
+          </a:prstGeom>
+          <a:solidFill>
+            <a:srgbClr val="C0C0C0"/>
+          </a:solidFill>
+          <a:ln w="9525">
+            <a:solidFill>
+              <a:schemeClr val="tx1"/>
+            </a:solidFill>
+            <a:prstDash val="dash"/>
+            <a:round/>
+            <a:headEnd/>
+            <a:tailEnd/>
+          </a:ln>
+          <a:effectLst/>
+          <a:extLst>
+            <a:ext uri="{AF507438-7753-43E0-B8FC-AC1667EBCBE1}">
+              <a14:hiddenEffects xmlns:a14="http://schemas.microsoft.com/office/drawing/2010/main">
+                <a:effectLst>
+                  <a:outerShdw dist="35921" dir="2700000" algn="ctr" rotWithShape="0">
+                    <a:schemeClr val="bg2"/>
+                  </a:outerShdw>
+                </a:effectLst>
+              </a14:hiddenEffects>
+            </a:ext>
+          </a:extLst>
+        </p:spPr>
+        <p:txBody>
+          <a:bodyPr wrap="none" anchor="ctr"/>
+          <a:lstStyle>
+            <a:lvl1pPr>
+              <a:spcBef>
+                <a:spcPct val="20000"/>
+              </a:spcBef>
+              <a:buChar char="•"/>
+              <a:defRPr sz="1700">
+                <a:solidFill>
+                  <a:schemeClr val="tx1"/>
+                </a:solidFill>
+                <a:latin typeface="Arial" panose="020B0604020202020204" pitchFamily="34" charset="0"/>
+              </a:defRPr>
+            </a:lvl1pPr>
+            <a:lvl2pPr marL="742950" indent="-285750">
+              <a:spcBef>
+                <a:spcPct val="20000"/>
+              </a:spcBef>
+              <a:buChar char="–"/>
+              <a:defRPr sz="1500">
+                <a:solidFill>
+                  <a:schemeClr val="tx1"/>
+                </a:solidFill>
+                <a:latin typeface="Arial" panose="020B0604020202020204" pitchFamily="34" charset="0"/>
+              </a:defRPr>
+            </a:lvl2pPr>
+            <a:lvl3pPr marL="1143000" indent="-228600">
+              <a:spcBef>
+                <a:spcPct val="20000"/>
+              </a:spcBef>
+              <a:buChar char="•"/>
+              <a:defRPr sz="1300">
+                <a:solidFill>
+                  <a:schemeClr val="tx1"/>
+                </a:solidFill>
+                <a:latin typeface="Arial" panose="020B0604020202020204" pitchFamily="34" charset="0"/>
+              </a:defRPr>
+            </a:lvl3pPr>
+            <a:lvl4pPr marL="1600200" indent="-228600">
+              <a:spcBef>
+                <a:spcPct val="20000"/>
+              </a:spcBef>
+              <a:buChar char="–"/>
+              <a:defRPr sz="1100">
+                <a:solidFill>
+                  <a:schemeClr val="tx1"/>
+                </a:solidFill>
+                <a:latin typeface="Arial" panose="020B0604020202020204" pitchFamily="34" charset="0"/>
+              </a:defRPr>
+            </a:lvl4pPr>
+            <a:lvl5pPr marL="2057400" indent="-228600">
+              <a:spcBef>
+                <a:spcPct val="20000"/>
+              </a:spcBef>
+              <a:buChar char="»"/>
+              <a:defRPr sz="1100">
+                <a:solidFill>
+                  <a:schemeClr val="tx1"/>
+                </a:solidFill>
+                <a:latin typeface="Arial" panose="020B0604020202020204" pitchFamily="34" charset="0"/>
+              </a:defRPr>
+            </a:lvl5pPr>
+            <a:lvl6pPr marL="2514600" indent="-228600" eaLnBrk="0" fontAlgn="base" hangingPunct="0">
+              <a:spcBef>
+                <a:spcPct val="20000"/>
+              </a:spcBef>
+              <a:spcAft>
+                <a:spcPct val="0"/>
+              </a:spcAft>
+              <a:buChar char="»"/>
+              <a:defRPr sz="1100">
+                <a:solidFill>
+                  <a:schemeClr val="tx1"/>
+                </a:solidFill>
+                <a:latin typeface="Arial" panose="020B0604020202020204" pitchFamily="34" charset="0"/>
+              </a:defRPr>
+            </a:lvl6pPr>
+            <a:lvl7pPr marL="2971800" indent="-228600" eaLnBrk="0" fontAlgn="base" hangingPunct="0">
+              <a:spcBef>
+                <a:spcPct val="20000"/>
+              </a:spcBef>
+              <a:spcAft>
+                <a:spcPct val="0"/>
+              </a:spcAft>
+              <a:buChar char="»"/>
+              <a:defRPr sz="1100">
+                <a:solidFill>
+                  <a:schemeClr val="tx1"/>
+                </a:solidFill>
+                <a:latin typeface="Arial" panose="020B0604020202020204" pitchFamily="34" charset="0"/>
+              </a:defRPr>
+            </a:lvl7pPr>
+            <a:lvl8pPr marL="3429000" indent="-228600" eaLnBrk="0" fontAlgn="base" hangingPunct="0">
+              <a:spcBef>
+                <a:spcPct val="20000"/>
+              </a:spcBef>
+              <a:spcAft>
+                <a:spcPct val="0"/>
+              </a:spcAft>
+              <a:buChar char="»"/>
+              <a:defRPr sz="1100">
+                <a:solidFill>
+                  <a:schemeClr val="tx1"/>
+                </a:solidFill>
+                <a:latin typeface="Arial" panose="020B0604020202020204" pitchFamily="34" charset="0"/>
+              </a:defRPr>
+            </a:lvl8pPr>
+            <a:lvl9pPr marL="3886200" indent="-228600" eaLnBrk="0" fontAlgn="base" hangingPunct="0">
+              <a:spcBef>
+                <a:spcPct val="20000"/>
+              </a:spcBef>
+              <a:spcAft>
+                <a:spcPct val="0"/>
+              </a:spcAft>
+              <a:buChar char="»"/>
+              <a:defRPr sz="1100">
+                <a:solidFill>
+                  <a:schemeClr val="tx1"/>
+                </a:solidFill>
+                <a:latin typeface="Arial" panose="020B0604020202020204" pitchFamily="34" charset="0"/>
+              </a:defRPr>
+            </a:lvl9pPr>
+          </a:lstStyle>
+          <a:p>
+            <a:pPr eaLnBrk="1" hangingPunct="1">
+              <a:spcBef>
+                <a:spcPct val="0"/>
+              </a:spcBef>
+              <a:buFontTx/>
+              <a:buNone/>
+            </a:pPr>
+            <a:r>
+              <a:rPr lang="de-DE" altLang="de-DE" sz="800" b="1" dirty="0" err="1" smtClean="0"/>
+              <a:t>oscm-deployer</a:t>
+            </a:r>
+            <a:endParaRPr lang="en-US" altLang="de-DE" sz="800" dirty="0"/>
+          </a:p>
+        </p:txBody>
+      </p:sp>
+      <p:cxnSp>
+        <p:nvCxnSpPr>
+          <p:cNvPr id="3" name="Straight Connector 2"/>
+          <p:cNvCxnSpPr/>
+          <p:nvPr/>
+        </p:nvCxnSpPr>
+        <p:spPr>
+          <a:xfrm>
+            <a:off x="987687" y="1100141"/>
+            <a:ext cx="100449" cy="0"/>
+          </a:xfrm>
+          <a:prstGeom prst="line">
+            <a:avLst/>
+          </a:prstGeom>
+        </p:spPr>
+        <p:style>
+          <a:lnRef idx="1">
+            <a:schemeClr val="accent1"/>
+          </a:lnRef>
+          <a:fillRef idx="0">
+            <a:schemeClr val="accent1"/>
+          </a:fillRef>
+          <a:effectRef idx="0">
+            <a:schemeClr val="accent1"/>
+          </a:effectRef>
+          <a:fontRef idx="minor">
+            <a:schemeClr val="tx1"/>
+          </a:fontRef>
+        </p:style>
+      </p:cxnSp>
+      <p:cxnSp>
+        <p:nvCxnSpPr>
+          <p:cNvPr id="10" name="Straight Connector 9"/>
+          <p:cNvCxnSpPr>
+            <a:stCxn id="27" idx="1"/>
+            <a:endCxn id="6" idx="0"/>
+          </p:cNvCxnSpPr>
+          <p:nvPr/>
+        </p:nvCxnSpPr>
+        <p:spPr>
+          <a:xfrm flipH="1">
+            <a:off x="731838" y="522711"/>
+            <a:ext cx="2059767" cy="577433"/>
+          </a:xfrm>
+          <a:prstGeom prst="line">
+            <a:avLst/>
+          </a:prstGeom>
+        </p:spPr>
+        <p:style>
+          <a:lnRef idx="1">
+            <a:schemeClr val="accent1"/>
+          </a:lnRef>
+          <a:fillRef idx="0">
+            <a:schemeClr val="accent1"/>
+          </a:fillRef>
+          <a:effectRef idx="0">
+            <a:schemeClr val="accent1"/>
+          </a:effectRef>
+          <a:fontRef idx="minor">
+            <a:schemeClr val="tx1"/>
+          </a:fontRef>
+        </p:style>
+      </p:cxnSp>
+      <p:cxnSp>
+        <p:nvCxnSpPr>
+          <p:cNvPr id="12" name="Straight Connector 11"/>
+          <p:cNvCxnSpPr>
+            <a:endCxn id="32" idx="0"/>
+          </p:cNvCxnSpPr>
+          <p:nvPr/>
+        </p:nvCxnSpPr>
+        <p:spPr>
+          <a:xfrm flipH="1">
+            <a:off x="1734335" y="749108"/>
+            <a:ext cx="1083750" cy="351033"/>
+          </a:xfrm>
+          <a:prstGeom prst="line">
+            <a:avLst/>
+          </a:prstGeom>
+        </p:spPr>
+        <p:style>
+          <a:lnRef idx="1">
+            <a:schemeClr val="accent1"/>
+          </a:lnRef>
+          <a:fillRef idx="0">
+            <a:schemeClr val="accent1"/>
+          </a:fillRef>
+          <a:effectRef idx="0">
+            <a:schemeClr val="accent1"/>
+          </a:effectRef>
+          <a:fontRef idx="minor">
+            <a:schemeClr val="tx1"/>
+          </a:fontRef>
+        </p:style>
+      </p:cxnSp>
+      <p:cxnSp>
+        <p:nvCxnSpPr>
+          <p:cNvPr id="14" name="Straight Connector 13"/>
+          <p:cNvCxnSpPr>
+            <a:stCxn id="27" idx="2"/>
+            <a:endCxn id="5" idx="0"/>
+          </p:cNvCxnSpPr>
+          <p:nvPr/>
+        </p:nvCxnSpPr>
+        <p:spPr>
+          <a:xfrm flipH="1">
+            <a:off x="2743204" y="788617"/>
+            <a:ext cx="493695" cy="314709"/>
+          </a:xfrm>
+          <a:prstGeom prst="line">
+            <a:avLst/>
+          </a:prstGeom>
+        </p:spPr>
+        <p:style>
+          <a:lnRef idx="1">
+            <a:schemeClr val="accent1"/>
+          </a:lnRef>
+          <a:fillRef idx="0">
+            <a:schemeClr val="accent1"/>
+          </a:fillRef>
+          <a:effectRef idx="0">
+            <a:schemeClr val="accent1"/>
+          </a:effectRef>
+          <a:fontRef idx="minor">
+            <a:schemeClr val="tx1"/>
+          </a:fontRef>
+        </p:style>
+      </p:cxnSp>
+      <p:cxnSp>
+        <p:nvCxnSpPr>
+          <p:cNvPr id="17" name="Straight Connector 16"/>
+          <p:cNvCxnSpPr>
+            <a:stCxn id="27" idx="2"/>
+            <a:endCxn id="7" idx="0"/>
+          </p:cNvCxnSpPr>
+          <p:nvPr/>
+        </p:nvCxnSpPr>
+        <p:spPr>
+          <a:xfrm>
+            <a:off x="3236899" y="788617"/>
+            <a:ext cx="494521" cy="311526"/>
+          </a:xfrm>
+          <a:prstGeom prst="line">
+            <a:avLst/>
+          </a:prstGeom>
+        </p:spPr>
+        <p:style>
+          <a:lnRef idx="1">
+            <a:schemeClr val="accent1"/>
+          </a:lnRef>
+          <a:fillRef idx="0">
+            <a:schemeClr val="accent1"/>
+          </a:fillRef>
+          <a:effectRef idx="0">
+            <a:schemeClr val="accent1"/>
+          </a:effectRef>
+          <a:fontRef idx="minor">
+            <a:schemeClr val="tx1"/>
+          </a:fontRef>
+        </p:style>
+      </p:cxnSp>
+      <p:cxnSp>
+        <p:nvCxnSpPr>
+          <p:cNvPr id="21" name="Straight Connector 20"/>
+          <p:cNvCxnSpPr>
+            <a:stCxn id="27" idx="3"/>
+            <a:endCxn id="31" idx="0"/>
+          </p:cNvCxnSpPr>
+          <p:nvPr/>
+        </p:nvCxnSpPr>
+        <p:spPr>
+          <a:xfrm>
+            <a:off x="3682192" y="522711"/>
+            <a:ext cx="2024852" cy="577430"/>
+          </a:xfrm>
+          <a:prstGeom prst="line">
+            <a:avLst/>
+          </a:prstGeom>
+        </p:spPr>
+        <p:style>
+          <a:lnRef idx="1">
+            <a:schemeClr val="accent1"/>
+          </a:lnRef>
+          <a:fillRef idx="0">
+            <a:schemeClr val="accent1"/>
+          </a:fillRef>
+          <a:effectRef idx="0">
+            <a:schemeClr val="accent1"/>
+          </a:effectRef>
+          <a:fontRef idx="minor">
+            <a:schemeClr val="tx1"/>
+          </a:fontRef>
+        </p:style>
+      </p:cxnSp>
+      <p:cxnSp>
+        <p:nvCxnSpPr>
+          <p:cNvPr id="23" name="Straight Connector 22"/>
+          <p:cNvCxnSpPr>
+            <a:endCxn id="8" idx="0"/>
+          </p:cNvCxnSpPr>
+          <p:nvPr/>
+        </p:nvCxnSpPr>
+        <p:spPr>
+          <a:xfrm>
+            <a:off x="3655713" y="765808"/>
+            <a:ext cx="1056777" cy="334334"/>
+          </a:xfrm>
+          <a:prstGeom prst="line">
+            <a:avLst/>
+          </a:prstGeom>
+        </p:spPr>
+        <p:style>
+          <a:lnRef idx="1">
+            <a:schemeClr val="accent1"/>
+          </a:lnRef>
+          <a:fillRef idx="0">
+            <a:schemeClr val="accent1"/>
+          </a:fillRef>
+          <a:effectRef idx="0">
+            <a:schemeClr val="accent1"/>
+          </a:effectRef>
+          <a:fontRef idx="minor">
+            <a:schemeClr val="tx1"/>
+          </a:fontRef>
+        </p:style>
+      </p:cxnSp>
     </p:spTree>
     <p:extLst>
       <p:ext uri="{BB962C8B-B14F-4D97-AF65-F5344CB8AC3E}">

</xml_diff>

<commit_message>
Operator and MP Owner - first draft for review
</commit_message>
<xml_diff>
--- a/Development/DocSources/en/Shared/_images/Containers.pptx
+++ b/Development/DocSources/en/Shared/_images/Containers.pptx
@@ -244,7 +244,7 @@
           <a:p>
             <a:fld id="{0D6885AC-6F9D-4C4F-B990-FB8E98106C15}" type="datetimeFigureOut">
               <a:rPr lang="de-DE" smtClean="0"/>
-              <a:t>28.11.2017</a:t>
+              <a:t>30.11.2017</a:t>
             </a:fld>
             <a:endParaRPr lang="de-DE"/>
           </a:p>
@@ -414,7 +414,7 @@
           <a:p>
             <a:fld id="{0D6885AC-6F9D-4C4F-B990-FB8E98106C15}" type="datetimeFigureOut">
               <a:rPr lang="de-DE" smtClean="0"/>
-              <a:t>28.11.2017</a:t>
+              <a:t>30.11.2017</a:t>
             </a:fld>
             <a:endParaRPr lang="de-DE"/>
           </a:p>
@@ -594,7 +594,7 @@
           <a:p>
             <a:fld id="{0D6885AC-6F9D-4C4F-B990-FB8E98106C15}" type="datetimeFigureOut">
               <a:rPr lang="de-DE" smtClean="0"/>
-              <a:t>28.11.2017</a:t>
+              <a:t>30.11.2017</a:t>
             </a:fld>
             <a:endParaRPr lang="de-DE"/>
           </a:p>
@@ -764,7 +764,7 @@
           <a:p>
             <a:fld id="{0D6885AC-6F9D-4C4F-B990-FB8E98106C15}" type="datetimeFigureOut">
               <a:rPr lang="de-DE" smtClean="0"/>
-              <a:t>28.11.2017</a:t>
+              <a:t>30.11.2017</a:t>
             </a:fld>
             <a:endParaRPr lang="de-DE"/>
           </a:p>
@@ -1010,7 +1010,7 @@
           <a:p>
             <a:fld id="{0D6885AC-6F9D-4C4F-B990-FB8E98106C15}" type="datetimeFigureOut">
               <a:rPr lang="de-DE" smtClean="0"/>
-              <a:t>28.11.2017</a:t>
+              <a:t>30.11.2017</a:t>
             </a:fld>
             <a:endParaRPr lang="de-DE"/>
           </a:p>
@@ -1242,7 +1242,7 @@
           <a:p>
             <a:fld id="{0D6885AC-6F9D-4C4F-B990-FB8E98106C15}" type="datetimeFigureOut">
               <a:rPr lang="de-DE" smtClean="0"/>
-              <a:t>28.11.2017</a:t>
+              <a:t>30.11.2017</a:t>
             </a:fld>
             <a:endParaRPr lang="de-DE"/>
           </a:p>
@@ -1609,7 +1609,7 @@
           <a:p>
             <a:fld id="{0D6885AC-6F9D-4C4F-B990-FB8E98106C15}" type="datetimeFigureOut">
               <a:rPr lang="de-DE" smtClean="0"/>
-              <a:t>28.11.2017</a:t>
+              <a:t>30.11.2017</a:t>
             </a:fld>
             <a:endParaRPr lang="de-DE"/>
           </a:p>
@@ -1727,7 +1727,7 @@
           <a:p>
             <a:fld id="{0D6885AC-6F9D-4C4F-B990-FB8E98106C15}" type="datetimeFigureOut">
               <a:rPr lang="de-DE" smtClean="0"/>
-              <a:t>28.11.2017</a:t>
+              <a:t>30.11.2017</a:t>
             </a:fld>
             <a:endParaRPr lang="de-DE"/>
           </a:p>
@@ -1822,7 +1822,7 @@
           <a:p>
             <a:fld id="{0D6885AC-6F9D-4C4F-B990-FB8E98106C15}" type="datetimeFigureOut">
               <a:rPr lang="de-DE" smtClean="0"/>
-              <a:t>28.11.2017</a:t>
+              <a:t>30.11.2017</a:t>
             </a:fld>
             <a:endParaRPr lang="de-DE"/>
           </a:p>
@@ -2099,7 +2099,7 @@
           <a:p>
             <a:fld id="{0D6885AC-6F9D-4C4F-B990-FB8E98106C15}" type="datetimeFigureOut">
               <a:rPr lang="de-DE" smtClean="0"/>
-              <a:t>28.11.2017</a:t>
+              <a:t>30.11.2017</a:t>
             </a:fld>
             <a:endParaRPr lang="de-DE"/>
           </a:p>
@@ -2352,7 +2352,7 @@
           <a:p>
             <a:fld id="{0D6885AC-6F9D-4C4F-B990-FB8E98106C15}" type="datetimeFigureOut">
               <a:rPr lang="de-DE" smtClean="0"/>
-              <a:t>28.11.2017</a:t>
+              <a:t>30.11.2017</a:t>
             </a:fld>
             <a:endParaRPr lang="de-DE"/>
           </a:p>
@@ -2565,7 +2565,7 @@
           <a:p>
             <a:fld id="{0D6885AC-6F9D-4C4F-B990-FB8E98106C15}" type="datetimeFigureOut">
               <a:rPr lang="de-DE" smtClean="0"/>
-              <a:t>28.11.2017</a:t>
+              <a:t>30.11.2017</a:t>
             </a:fld>
             <a:endParaRPr lang="de-DE"/>
           </a:p>
@@ -3471,10 +3471,14 @@
               <a:buNone/>
             </a:pPr>
             <a:r>
-              <a:rPr lang="de-DE" altLang="de-DE" sz="800" b="1"/>
-              <a:t>oscm-core</a:t>
-            </a:r>
-            <a:endParaRPr lang="en-US" altLang="de-DE" sz="800"/>
+              <a:rPr lang="de-DE" altLang="de-DE" sz="800" b="1" dirty="0" err="1"/>
+              <a:t>oscm</a:t>
+            </a:r>
+            <a:r>
+              <a:rPr lang="de-DE" altLang="de-DE" sz="800" b="1" dirty="0"/>
+              <a:t>-core</a:t>
+            </a:r>
+            <a:endParaRPr lang="en-US" altLang="de-DE" sz="800" dirty="0"/>
           </a:p>
         </p:txBody>
       </p:sp>
@@ -5370,10 +5374,10 @@
               <a:buNone/>
             </a:pPr>
             <a:r>
-              <a:rPr lang="de-DE" altLang="de-DE" sz="800" b="1"/>
+              <a:rPr lang="de-DE" altLang="de-DE" sz="800" b="1" dirty="0"/>
               <a:t>Web Browser</a:t>
             </a:r>
-            <a:endParaRPr lang="en-US" altLang="de-DE" sz="800"/>
+            <a:endParaRPr lang="en-US" altLang="de-DE" sz="800" dirty="0"/>
           </a:p>
         </p:txBody>
       </p:sp>
@@ -5771,6 +5775,10 @@
             <a:pPr eaLnBrk="1" hangingPunct="1">
               <a:defRPr/>
             </a:pPr>
+            <a:r>
+              <a:rPr lang="de-DE" altLang="de-DE" sz="800" b="1" dirty="0" smtClean="0"/>
+              <a:t>8543</a:t>
+            </a:r>
             <a:endParaRPr lang="de-DE" altLang="de-DE" sz="800" b="1" dirty="0"/>
           </a:p>
         </p:txBody>
@@ -6036,82 +6044,11 @@
             <a:pPr eaLnBrk="1" hangingPunct="1">
               <a:defRPr/>
             </a:pPr>
+            <a:r>
+              <a:rPr lang="de-DE" altLang="de-DE" sz="800" b="1" dirty="0" smtClean="0"/>
+              <a:t>5432</a:t>
+            </a:r>
             <a:endParaRPr lang="de-DE" altLang="de-DE" sz="800" b="1" dirty="0"/>
-          </a:p>
-        </p:txBody>
-      </p:sp>
-      <p:sp>
-        <p:nvSpPr>
-          <p:cNvPr id="33" name="Can 32"/>
-          <p:cNvSpPr/>
-          <p:nvPr/>
-        </p:nvSpPr>
-        <p:spPr>
-          <a:xfrm>
-            <a:off x="4826000" y="2894839"/>
-            <a:ext cx="619125" cy="571500"/>
-          </a:xfrm>
-          <a:prstGeom prst="can">
-            <a:avLst/>
-          </a:prstGeom>
-          <a:noFill/>
-        </p:spPr>
-        <p:style>
-          <a:lnRef idx="2">
-            <a:schemeClr val="accent1">
-              <a:shade val="50000"/>
-            </a:schemeClr>
-          </a:lnRef>
-          <a:fillRef idx="1">
-            <a:schemeClr val="accent1"/>
-          </a:fillRef>
-          <a:effectRef idx="0">
-            <a:schemeClr val="accent1"/>
-          </a:effectRef>
-          <a:fontRef idx="minor">
-            <a:schemeClr val="lt1"/>
-          </a:fontRef>
-        </p:style>
-        <p:txBody>
-          <a:bodyPr rtlCol="0" anchor="ctr"/>
-          <a:lstStyle/>
-          <a:p>
-            <a:pPr algn="ctr"/>
-            <a:endParaRPr lang="de-DE"/>
-          </a:p>
-        </p:txBody>
-      </p:sp>
-      <p:sp>
-        <p:nvSpPr>
-          <p:cNvPr id="34" name="Rectangle 33"/>
-          <p:cNvSpPr/>
-          <p:nvPr/>
-        </p:nvSpPr>
-        <p:spPr>
-          <a:xfrm>
-            <a:off x="4836068" y="3111557"/>
-            <a:ext cx="591829" cy="246221"/>
-          </a:xfrm>
-          <a:prstGeom prst="rect">
-            <a:avLst/>
-          </a:prstGeom>
-        </p:spPr>
-        <p:txBody>
-          <a:bodyPr wrap="none">
-            <a:spAutoFit/>
-          </a:bodyPr>
-          <a:lstStyle/>
-          <a:p>
-            <a:pPr algn="ctr">
-              <a:spcBef>
-                <a:spcPct val="0"/>
-              </a:spcBef>
-            </a:pPr>
-            <a:r>
-              <a:rPr lang="de-DE" altLang="de-DE" sz="1000" b="1" dirty="0" smtClean="0"/>
-              <a:t>Storage</a:t>
-            </a:r>
-            <a:endParaRPr lang="en-US" altLang="de-DE" sz="1000" dirty="0"/>
           </a:p>
         </p:txBody>
       </p:sp>
@@ -6120,14 +6057,14 @@
           <p:cNvPr id="37" name="Straight Arrow Connector 36"/>
           <p:cNvCxnSpPr>
             <a:stCxn id="32" idx="2"/>
-            <a:endCxn id="33" idx="1"/>
+            <a:endCxn id="54" idx="1"/>
           </p:cNvCxnSpPr>
           <p:nvPr/>
         </p:nvCxnSpPr>
         <p:spPr>
-          <a:xfrm>
-            <a:off x="5120323" y="2434940"/>
-            <a:ext cx="15240" cy="459899"/>
+          <a:xfrm flipH="1">
+            <a:off x="5116738" y="2434940"/>
+            <a:ext cx="3585" cy="530114"/>
           </a:xfrm>
           <a:prstGeom prst="straightConnector1">
             <a:avLst/>
@@ -6444,6 +6381,408 @@
           </a:fontRef>
         </p:style>
       </p:cxnSp>
+      <p:grpSp>
+        <p:nvGrpSpPr>
+          <p:cNvPr id="44" name="Group 43"/>
+          <p:cNvGrpSpPr/>
+          <p:nvPr/>
+        </p:nvGrpSpPr>
+        <p:grpSpPr>
+          <a:xfrm>
+            <a:off x="4178462" y="2965054"/>
+            <a:ext cx="1883720" cy="890776"/>
+            <a:chOff x="6020816" y="3659887"/>
+            <a:chExt cx="1883720" cy="890776"/>
+          </a:xfrm>
+        </p:grpSpPr>
+        <p:sp>
+          <p:nvSpPr>
+            <p:cNvPr id="54" name="Can 53"/>
+            <p:cNvSpPr/>
+            <p:nvPr/>
+          </p:nvSpPr>
+          <p:spPr>
+            <a:xfrm>
+              <a:off x="6020816" y="3659887"/>
+              <a:ext cx="1876552" cy="890776"/>
+            </a:xfrm>
+            <a:prstGeom prst="can">
+              <a:avLst/>
+            </a:prstGeom>
+            <a:noFill/>
+          </p:spPr>
+          <p:style>
+            <a:lnRef idx="2">
+              <a:schemeClr val="accent1">
+                <a:shade val="50000"/>
+              </a:schemeClr>
+            </a:lnRef>
+            <a:fillRef idx="1">
+              <a:schemeClr val="accent1"/>
+            </a:fillRef>
+            <a:effectRef idx="0">
+              <a:schemeClr val="accent1"/>
+            </a:effectRef>
+            <a:fontRef idx="minor">
+              <a:schemeClr val="lt1"/>
+            </a:fontRef>
+          </p:style>
+          <p:txBody>
+            <a:bodyPr rtlCol="0" anchor="ctr"/>
+            <a:lstStyle/>
+            <a:p>
+              <a:pPr algn="ctr"/>
+              <a:endParaRPr lang="de-DE"/>
+            </a:p>
+          </p:txBody>
+        </p:sp>
+        <p:sp>
+          <p:nvSpPr>
+            <p:cNvPr id="55" name="Rectangle 54"/>
+            <p:cNvSpPr/>
+            <p:nvPr/>
+          </p:nvSpPr>
+          <p:spPr>
+            <a:xfrm>
+              <a:off x="6663177" y="3859054"/>
+              <a:ext cx="591829" cy="246221"/>
+            </a:xfrm>
+            <a:prstGeom prst="rect">
+              <a:avLst/>
+            </a:prstGeom>
+          </p:spPr>
+          <p:txBody>
+            <a:bodyPr wrap="none">
+              <a:spAutoFit/>
+            </a:bodyPr>
+            <a:lstStyle/>
+            <a:p>
+              <a:pPr algn="ctr">
+                <a:spcBef>
+                  <a:spcPct val="0"/>
+                </a:spcBef>
+              </a:pPr>
+              <a:r>
+                <a:rPr lang="de-DE" altLang="de-DE" sz="1000" b="1" dirty="0" smtClean="0"/>
+                <a:t>Storage</a:t>
+              </a:r>
+              <a:endParaRPr lang="en-US" altLang="de-DE" sz="1000" dirty="0"/>
+            </a:p>
+          </p:txBody>
+        </p:sp>
+        <p:grpSp>
+          <p:nvGrpSpPr>
+            <p:cNvPr id="39" name="Group 38"/>
+            <p:cNvGrpSpPr/>
+            <p:nvPr/>
+          </p:nvGrpSpPr>
+          <p:grpSpPr>
+            <a:xfrm>
+              <a:off x="6075957" y="4171595"/>
+              <a:ext cx="545119" cy="298892"/>
+              <a:chOff x="4379341" y="5684520"/>
+              <a:chExt cx="545119" cy="298892"/>
+            </a:xfrm>
+          </p:grpSpPr>
+          <p:sp>
+            <p:nvSpPr>
+              <p:cNvPr id="56" name="Can 55"/>
+              <p:cNvSpPr/>
+              <p:nvPr/>
+            </p:nvSpPr>
+            <p:spPr>
+              <a:xfrm>
+                <a:off x="4379341" y="5684520"/>
+                <a:ext cx="545119" cy="298892"/>
+              </a:xfrm>
+              <a:prstGeom prst="can">
+                <a:avLst/>
+              </a:prstGeom>
+              <a:noFill/>
+            </p:spPr>
+            <p:style>
+              <a:lnRef idx="2">
+                <a:schemeClr val="accent1">
+                  <a:shade val="50000"/>
+                </a:schemeClr>
+              </a:lnRef>
+              <a:fillRef idx="1">
+                <a:schemeClr val="accent1"/>
+              </a:fillRef>
+              <a:effectRef idx="0">
+                <a:schemeClr val="accent1"/>
+              </a:effectRef>
+              <a:fontRef idx="minor">
+                <a:schemeClr val="lt1"/>
+              </a:fontRef>
+            </p:style>
+            <p:txBody>
+              <a:bodyPr rtlCol="0" anchor="ctr"/>
+              <a:lstStyle/>
+              <a:p>
+                <a:pPr>
+                  <a:spcBef>
+                    <a:spcPct val="0"/>
+                  </a:spcBef>
+                </a:pPr>
+                <a:r>
+                  <a:rPr lang="de-DE" altLang="de-DE" b="1" dirty="0" smtClean="0"/>
+                  <a:t>r</a:t>
+                </a:r>
+                <a:endParaRPr lang="en-US" altLang="de-DE" dirty="0"/>
+              </a:p>
+            </p:txBody>
+          </p:sp>
+          <p:sp>
+            <p:nvSpPr>
+              <p:cNvPr id="58" name="Rectangle 57"/>
+              <p:cNvSpPr/>
+              <p:nvPr/>
+            </p:nvSpPr>
+            <p:spPr>
+              <a:xfrm>
+                <a:off x="4471416" y="5767968"/>
+                <a:ext cx="362600" cy="215444"/>
+              </a:xfrm>
+              <a:prstGeom prst="rect">
+                <a:avLst/>
+              </a:prstGeom>
+            </p:spPr>
+            <p:txBody>
+              <a:bodyPr wrap="none">
+                <a:spAutoFit/>
+              </a:bodyPr>
+              <a:lstStyle/>
+              <a:p>
+                <a:pPr>
+                  <a:spcBef>
+                    <a:spcPct val="0"/>
+                  </a:spcBef>
+                </a:pPr>
+                <a:r>
+                  <a:rPr lang="de-DE" altLang="de-DE" sz="800" b="1" dirty="0" err="1" smtClean="0">
+                    <a:latin typeface="Arial" panose="020B0604020202020204" pitchFamily="34" charset="0"/>
+                    <a:cs typeface="Arial" panose="020B0604020202020204" pitchFamily="34" charset="0"/>
+                  </a:rPr>
+                  <a:t>bss</a:t>
+                </a:r>
+                <a:endParaRPr lang="en-US" altLang="de-DE" sz="800" dirty="0">
+                  <a:latin typeface="Arial" panose="020B0604020202020204" pitchFamily="34" charset="0"/>
+                  <a:cs typeface="Arial" panose="020B0604020202020204" pitchFamily="34" charset="0"/>
+                </a:endParaRPr>
+              </a:p>
+            </p:txBody>
+          </p:sp>
+        </p:grpSp>
+        <p:grpSp>
+          <p:nvGrpSpPr>
+            <p:cNvPr id="40" name="Group 39"/>
+            <p:cNvGrpSpPr/>
+            <p:nvPr/>
+          </p:nvGrpSpPr>
+          <p:grpSpPr>
+            <a:xfrm>
+              <a:off x="6725343" y="4178523"/>
+              <a:ext cx="559456" cy="298892"/>
+              <a:chOff x="3955669" y="4423349"/>
+              <a:chExt cx="559456" cy="298892"/>
+            </a:xfrm>
+          </p:grpSpPr>
+          <p:sp>
+            <p:nvSpPr>
+              <p:cNvPr id="68" name="Can 67"/>
+              <p:cNvSpPr/>
+              <p:nvPr/>
+            </p:nvSpPr>
+            <p:spPr>
+              <a:xfrm>
+                <a:off x="3955669" y="4423349"/>
+                <a:ext cx="545119" cy="298892"/>
+              </a:xfrm>
+              <a:prstGeom prst="can">
+                <a:avLst/>
+              </a:prstGeom>
+              <a:noFill/>
+            </p:spPr>
+            <p:style>
+              <a:lnRef idx="2">
+                <a:schemeClr val="accent1">
+                  <a:shade val="50000"/>
+                </a:schemeClr>
+              </a:lnRef>
+              <a:fillRef idx="1">
+                <a:schemeClr val="accent1"/>
+              </a:fillRef>
+              <a:effectRef idx="0">
+                <a:schemeClr val="accent1"/>
+              </a:effectRef>
+              <a:fontRef idx="minor">
+                <a:schemeClr val="lt1"/>
+              </a:fontRef>
+            </p:style>
+            <p:txBody>
+              <a:bodyPr rtlCol="0" anchor="ctr"/>
+              <a:lstStyle/>
+              <a:p>
+                <a:pPr>
+                  <a:spcBef>
+                    <a:spcPct val="0"/>
+                  </a:spcBef>
+                </a:pPr>
+                <a:r>
+                  <a:rPr lang="de-DE" altLang="de-DE" b="1" dirty="0" smtClean="0"/>
+                  <a:t>r</a:t>
+                </a:r>
+                <a:endParaRPr lang="en-US" altLang="de-DE" dirty="0"/>
+              </a:p>
+            </p:txBody>
+          </p:sp>
+          <p:sp>
+            <p:nvSpPr>
+              <p:cNvPr id="69" name="Rectangle 68"/>
+              <p:cNvSpPr/>
+              <p:nvPr/>
+            </p:nvSpPr>
+            <p:spPr>
+              <a:xfrm>
+                <a:off x="3974592" y="4506797"/>
+                <a:ext cx="540533" cy="215444"/>
+              </a:xfrm>
+              <a:prstGeom prst="rect">
+                <a:avLst/>
+              </a:prstGeom>
+            </p:spPr>
+            <p:txBody>
+              <a:bodyPr wrap="none">
+                <a:spAutoFit/>
+              </a:bodyPr>
+              <a:lstStyle/>
+              <a:p>
+                <a:pPr>
+                  <a:spcBef>
+                    <a:spcPct val="0"/>
+                  </a:spcBef>
+                </a:pPr>
+                <a:r>
+                  <a:rPr lang="de-DE" altLang="de-DE" sz="800" b="1" dirty="0" err="1" smtClean="0">
+                    <a:latin typeface="Arial" panose="020B0604020202020204" pitchFamily="34" charset="0"/>
+                    <a:cs typeface="Arial" panose="020B0604020202020204" pitchFamily="34" charset="0"/>
+                  </a:rPr>
+                  <a:t>bssjms</a:t>
+                </a:r>
+                <a:endParaRPr lang="en-US" altLang="de-DE" sz="800" dirty="0">
+                  <a:latin typeface="Arial" panose="020B0604020202020204" pitchFamily="34" charset="0"/>
+                  <a:cs typeface="Arial" panose="020B0604020202020204" pitchFamily="34" charset="0"/>
+                </a:endParaRPr>
+              </a:p>
+            </p:txBody>
+          </p:sp>
+        </p:grpSp>
+        <p:grpSp>
+          <p:nvGrpSpPr>
+            <p:cNvPr id="42" name="Group 41"/>
+            <p:cNvGrpSpPr/>
+            <p:nvPr/>
+          </p:nvGrpSpPr>
+          <p:grpSpPr>
+            <a:xfrm>
+              <a:off x="7331127" y="4171595"/>
+              <a:ext cx="573409" cy="298892"/>
+              <a:chOff x="3348464" y="5123049"/>
+              <a:chExt cx="573409" cy="298892"/>
+            </a:xfrm>
+          </p:grpSpPr>
+          <p:sp>
+            <p:nvSpPr>
+              <p:cNvPr id="71" name="Can 70"/>
+              <p:cNvSpPr/>
+              <p:nvPr/>
+            </p:nvSpPr>
+            <p:spPr>
+              <a:xfrm>
+                <a:off x="3348464" y="5123049"/>
+                <a:ext cx="545119" cy="298892"/>
+              </a:xfrm>
+              <a:prstGeom prst="can">
+                <a:avLst/>
+              </a:prstGeom>
+              <a:noFill/>
+            </p:spPr>
+            <p:style>
+              <a:lnRef idx="2">
+                <a:schemeClr val="accent1">
+                  <a:shade val="50000"/>
+                </a:schemeClr>
+              </a:lnRef>
+              <a:fillRef idx="1">
+                <a:schemeClr val="accent1"/>
+              </a:fillRef>
+              <a:effectRef idx="0">
+                <a:schemeClr val="accent1"/>
+              </a:effectRef>
+              <a:fontRef idx="minor">
+                <a:schemeClr val="lt1"/>
+              </a:fontRef>
+            </p:style>
+            <p:txBody>
+              <a:bodyPr rtlCol="0" anchor="ctr"/>
+              <a:lstStyle/>
+              <a:p>
+                <a:pPr>
+                  <a:spcBef>
+                    <a:spcPct val="0"/>
+                  </a:spcBef>
+                </a:pPr>
+                <a:r>
+                  <a:rPr lang="de-DE" altLang="de-DE" b="1" dirty="0" smtClean="0"/>
+                  <a:t>r</a:t>
+                </a:r>
+                <a:endParaRPr lang="en-US" altLang="de-DE" dirty="0"/>
+              </a:p>
+            </p:txBody>
+          </p:sp>
+          <p:sp>
+            <p:nvSpPr>
+              <p:cNvPr id="72" name="Rectangle 71"/>
+              <p:cNvSpPr/>
+              <p:nvPr/>
+            </p:nvSpPr>
+            <p:spPr>
+              <a:xfrm>
+                <a:off x="3376531" y="5206497"/>
+                <a:ext cx="545342" cy="215444"/>
+              </a:xfrm>
+              <a:prstGeom prst="rect">
+                <a:avLst/>
+              </a:prstGeom>
+            </p:spPr>
+            <p:txBody>
+              <a:bodyPr wrap="none">
+                <a:spAutoFit/>
+              </a:bodyPr>
+              <a:lstStyle/>
+              <a:p>
+                <a:pPr>
+                  <a:spcBef>
+                    <a:spcPct val="0"/>
+                  </a:spcBef>
+                </a:pPr>
+                <a:r>
+                  <a:rPr lang="de-DE" altLang="de-DE" sz="800" b="1" dirty="0" err="1" smtClean="0">
+                    <a:latin typeface="Arial" panose="020B0604020202020204" pitchFamily="34" charset="0"/>
+                    <a:cs typeface="Arial" panose="020B0604020202020204" pitchFamily="34" charset="0"/>
+                  </a:rPr>
+                  <a:t>bssapp</a:t>
+                </a:r>
+                <a:endParaRPr lang="en-US" altLang="de-DE" sz="800" dirty="0">
+                  <a:latin typeface="Arial" panose="020B0604020202020204" pitchFamily="34" charset="0"/>
+                  <a:cs typeface="Arial" panose="020B0604020202020204" pitchFamily="34" charset="0"/>
+                </a:endParaRPr>
+              </a:p>
+            </p:txBody>
+          </p:sp>
+        </p:grpSp>
+      </p:grpSp>
     </p:spTree>
     <p:extLst>
       <p:ext uri="{BB962C8B-B14F-4D97-AF65-F5344CB8AC3E}">

</xml_diff>

<commit_message>
Quick Start Guide 18.1 for Review - incl. OIDC
</commit_message>
<xml_diff>
--- a/Development/DocSources/en/Shared/_images/Containers.pptx
+++ b/Development/DocSources/en/Shared/_images/Containers.pptx
@@ -244,7 +244,7 @@
           <a:p>
             <a:fld id="{0D6885AC-6F9D-4C4F-B990-FB8E98106C15}" type="datetimeFigureOut">
               <a:rPr lang="de-DE" smtClean="0"/>
-              <a:t>30.11.2017</a:t>
+              <a:t>14.11.2019</a:t>
             </a:fld>
             <a:endParaRPr lang="de-DE"/>
           </a:p>
@@ -414,7 +414,7 @@
           <a:p>
             <a:fld id="{0D6885AC-6F9D-4C4F-B990-FB8E98106C15}" type="datetimeFigureOut">
               <a:rPr lang="de-DE" smtClean="0"/>
-              <a:t>30.11.2017</a:t>
+              <a:t>14.11.2019</a:t>
             </a:fld>
             <a:endParaRPr lang="de-DE"/>
           </a:p>
@@ -594,7 +594,7 @@
           <a:p>
             <a:fld id="{0D6885AC-6F9D-4C4F-B990-FB8E98106C15}" type="datetimeFigureOut">
               <a:rPr lang="de-DE" smtClean="0"/>
-              <a:t>30.11.2017</a:t>
+              <a:t>14.11.2019</a:t>
             </a:fld>
             <a:endParaRPr lang="de-DE"/>
           </a:p>
@@ -764,7 +764,7 @@
           <a:p>
             <a:fld id="{0D6885AC-6F9D-4C4F-B990-FB8E98106C15}" type="datetimeFigureOut">
               <a:rPr lang="de-DE" smtClean="0"/>
-              <a:t>30.11.2017</a:t>
+              <a:t>14.11.2019</a:t>
             </a:fld>
             <a:endParaRPr lang="de-DE"/>
           </a:p>
@@ -1010,7 +1010,7 @@
           <a:p>
             <a:fld id="{0D6885AC-6F9D-4C4F-B990-FB8E98106C15}" type="datetimeFigureOut">
               <a:rPr lang="de-DE" smtClean="0"/>
-              <a:t>30.11.2017</a:t>
+              <a:t>14.11.2019</a:t>
             </a:fld>
             <a:endParaRPr lang="de-DE"/>
           </a:p>
@@ -1242,7 +1242,7 @@
           <a:p>
             <a:fld id="{0D6885AC-6F9D-4C4F-B990-FB8E98106C15}" type="datetimeFigureOut">
               <a:rPr lang="de-DE" smtClean="0"/>
-              <a:t>30.11.2017</a:t>
+              <a:t>14.11.2019</a:t>
             </a:fld>
             <a:endParaRPr lang="de-DE"/>
           </a:p>
@@ -1609,7 +1609,7 @@
           <a:p>
             <a:fld id="{0D6885AC-6F9D-4C4F-B990-FB8E98106C15}" type="datetimeFigureOut">
               <a:rPr lang="de-DE" smtClean="0"/>
-              <a:t>30.11.2017</a:t>
+              <a:t>14.11.2019</a:t>
             </a:fld>
             <a:endParaRPr lang="de-DE"/>
           </a:p>
@@ -1727,7 +1727,7 @@
           <a:p>
             <a:fld id="{0D6885AC-6F9D-4C4F-B990-FB8E98106C15}" type="datetimeFigureOut">
               <a:rPr lang="de-DE" smtClean="0"/>
-              <a:t>30.11.2017</a:t>
+              <a:t>14.11.2019</a:t>
             </a:fld>
             <a:endParaRPr lang="de-DE"/>
           </a:p>
@@ -1822,7 +1822,7 @@
           <a:p>
             <a:fld id="{0D6885AC-6F9D-4C4F-B990-FB8E98106C15}" type="datetimeFigureOut">
               <a:rPr lang="de-DE" smtClean="0"/>
-              <a:t>30.11.2017</a:t>
+              <a:t>14.11.2019</a:t>
             </a:fld>
             <a:endParaRPr lang="de-DE"/>
           </a:p>
@@ -2099,7 +2099,7 @@
           <a:p>
             <a:fld id="{0D6885AC-6F9D-4C4F-B990-FB8E98106C15}" type="datetimeFigureOut">
               <a:rPr lang="de-DE" smtClean="0"/>
-              <a:t>30.11.2017</a:t>
+              <a:t>14.11.2019</a:t>
             </a:fld>
             <a:endParaRPr lang="de-DE"/>
           </a:p>
@@ -2352,7 +2352,7 @@
           <a:p>
             <a:fld id="{0D6885AC-6F9D-4C4F-B990-FB8E98106C15}" type="datetimeFigureOut">
               <a:rPr lang="de-DE" smtClean="0"/>
-              <a:t>30.11.2017</a:t>
+              <a:t>14.11.2019</a:t>
             </a:fld>
             <a:endParaRPr lang="de-DE"/>
           </a:p>
@@ -2565,7 +2565,7 @@
           <a:p>
             <a:fld id="{0D6885AC-6F9D-4C4F-B990-FB8E98106C15}" type="datetimeFigureOut">
               <a:rPr lang="de-DE" smtClean="0"/>
-              <a:t>30.11.2017</a:t>
+              <a:t>14.11.2019</a:t>
             </a:fld>
             <a:endParaRPr lang="de-DE"/>
           </a:p>
@@ -2980,8 +2980,8 @@
         </p:nvSpPr>
         <p:spPr bwMode="auto">
           <a:xfrm>
-            <a:off x="0" y="69850"/>
-            <a:ext cx="5705856" cy="2749550"/>
+            <a:off x="66676" y="69850"/>
+            <a:ext cx="6697090" cy="2749550"/>
           </a:xfrm>
           <a:prstGeom prst="rect">
             <a:avLst/>
@@ -3122,7 +3122,7 @@
         </p:nvSpPr>
         <p:spPr bwMode="auto">
           <a:xfrm>
-            <a:off x="1219200" y="1676400"/>
+            <a:off x="2400300" y="1676400"/>
             <a:ext cx="890588" cy="531813"/>
           </a:xfrm>
           <a:prstGeom prst="roundRect">
@@ -3280,7 +3280,7 @@
             </a:lvl9pPr>
           </a:lstStyle>
           <a:p>
-            <a:pPr eaLnBrk="1" hangingPunct="1">
+            <a:pPr algn="ctr" eaLnBrk="1" hangingPunct="1">
               <a:spcBef>
                 <a:spcPct val="0"/>
               </a:spcBef>
@@ -3305,7 +3305,7 @@
         </p:nvSpPr>
         <p:spPr bwMode="auto">
           <a:xfrm>
-            <a:off x="100013" y="1676400"/>
+            <a:off x="1281113" y="1676400"/>
             <a:ext cx="890587" cy="531813"/>
           </a:xfrm>
           <a:prstGeom prst="roundRect">
@@ -3463,7 +3463,7 @@
             </a:lvl9pPr>
           </a:lstStyle>
           <a:p>
-            <a:pPr eaLnBrk="1" hangingPunct="1">
+            <a:pPr algn="ctr" eaLnBrk="1" hangingPunct="1">
               <a:spcBef>
                 <a:spcPct val="0"/>
               </a:spcBef>
@@ -3492,7 +3492,7 @@
         </p:nvSpPr>
         <p:spPr bwMode="auto">
           <a:xfrm>
-            <a:off x="2362200" y="1676400"/>
+            <a:off x="3543300" y="1676400"/>
             <a:ext cx="890588" cy="531813"/>
           </a:xfrm>
           <a:prstGeom prst="roundRect">
@@ -3650,7 +3650,7 @@
             </a:lvl9pPr>
           </a:lstStyle>
           <a:p>
-            <a:pPr eaLnBrk="1" hangingPunct="1">
+            <a:pPr algn="ctr" eaLnBrk="1" hangingPunct="1">
               <a:spcBef>
                 <a:spcPct val="0"/>
               </a:spcBef>
@@ -3675,7 +3675,7 @@
         </p:nvSpPr>
         <p:spPr bwMode="auto">
           <a:xfrm>
-            <a:off x="3505200" y="1676400"/>
+            <a:off x="4686300" y="1676400"/>
             <a:ext cx="914400" cy="531813"/>
           </a:xfrm>
           <a:prstGeom prst="roundRect">
@@ -3833,7 +3833,7 @@
             </a:lvl9pPr>
           </a:lstStyle>
           <a:p>
-            <a:pPr eaLnBrk="1" hangingPunct="1">
+            <a:pPr algn="ctr" eaLnBrk="1" hangingPunct="1">
               <a:spcBef>
                 <a:spcPct val="0"/>
               </a:spcBef>
@@ -3856,7 +3856,7 @@
         </p:nvSpPr>
         <p:spPr bwMode="auto">
           <a:xfrm>
-            <a:off x="238125" y="2135188"/>
+            <a:off x="1393083" y="2135188"/>
             <a:ext cx="669925" cy="379412"/>
           </a:xfrm>
           <a:prstGeom prst="rect">
@@ -3908,7 +3908,7 @@
         </p:nvSpPr>
         <p:spPr bwMode="auto">
           <a:xfrm>
-            <a:off x="252413" y="1371600"/>
+            <a:off x="1433513" y="1371600"/>
             <a:ext cx="714375" cy="379413"/>
           </a:xfrm>
           <a:prstGeom prst="rect">
@@ -3964,7 +3964,7 @@
         </p:nvSpPr>
         <p:spPr bwMode="auto">
           <a:xfrm>
-            <a:off x="1371600" y="1371600"/>
+            <a:off x="2552700" y="1371600"/>
             <a:ext cx="669925" cy="379413"/>
           </a:xfrm>
           <a:prstGeom prst="rect">
@@ -4017,7 +4017,7 @@
         </p:nvSpPr>
         <p:spPr bwMode="auto">
           <a:xfrm>
-            <a:off x="2514600" y="1371600"/>
+            <a:off x="3695700" y="1371600"/>
             <a:ext cx="669925" cy="379413"/>
           </a:xfrm>
           <a:prstGeom prst="rect">
@@ -4071,7 +4071,7 @@
         </p:nvSpPr>
         <p:spPr bwMode="auto">
           <a:xfrm>
-            <a:off x="1371600" y="2133600"/>
+            <a:off x="2499570" y="2127250"/>
             <a:ext cx="669925" cy="379413"/>
           </a:xfrm>
           <a:prstGeom prst="rect">
@@ -4123,7 +4123,7 @@
         </p:nvSpPr>
         <p:spPr bwMode="auto">
           <a:xfrm>
-            <a:off x="2514600" y="2133600"/>
+            <a:off x="3664624" y="2133599"/>
             <a:ext cx="669925" cy="379413"/>
           </a:xfrm>
           <a:prstGeom prst="rect">
@@ -4176,7 +4176,7 @@
         </p:nvSpPr>
         <p:spPr bwMode="auto">
           <a:xfrm>
-            <a:off x="3657600" y="2133600"/>
+            <a:off x="4808537" y="2133599"/>
             <a:ext cx="669925" cy="379413"/>
           </a:xfrm>
           <a:prstGeom prst="rect">
@@ -4231,7 +4231,7 @@
         </p:nvSpPr>
         <p:spPr bwMode="auto">
           <a:xfrm>
-            <a:off x="95250" y="69850"/>
+            <a:off x="118522" y="84137"/>
             <a:ext cx="1447800" cy="246063"/>
           </a:xfrm>
           <a:prstGeom prst="rect">
@@ -4366,9 +4366,14 @@
           <a:p>
             <a:pPr eaLnBrk="1" hangingPunct="1"/>
             <a:r>
-              <a:rPr lang="de-DE" altLang="de-DE" b="1"/>
-              <a:t>Docker Host (VM)</a:t>
-            </a:r>
+              <a:rPr lang="de-DE" altLang="de-DE" b="1" dirty="0"/>
+              <a:t>Docker </a:t>
+            </a:r>
+            <a:r>
+              <a:rPr lang="de-DE" altLang="de-DE" b="1" dirty="0" smtClean="0"/>
+              <a:t>Host</a:t>
+            </a:r>
+            <a:endParaRPr lang="de-DE" altLang="de-DE" b="1" dirty="0"/>
           </a:p>
         </p:txBody>
       </p:sp>
@@ -4382,7 +4387,7 @@
         </p:nvSpPr>
         <p:spPr bwMode="auto">
           <a:xfrm>
-            <a:off x="571500" y="2952750"/>
+            <a:off x="1752600" y="2952750"/>
             <a:ext cx="495300" cy="215900"/>
           </a:xfrm>
           <a:prstGeom prst="rect">
@@ -4533,7 +4538,7 @@
         </p:nvSpPr>
         <p:spPr bwMode="auto">
           <a:xfrm>
-            <a:off x="804863" y="297656"/>
+            <a:off x="1985963" y="297656"/>
             <a:ext cx="495300" cy="215900"/>
           </a:xfrm>
           <a:prstGeom prst="rect">
@@ -4684,7 +4689,7 @@
         </p:nvSpPr>
         <p:spPr bwMode="auto">
           <a:xfrm>
-            <a:off x="876300" y="632222"/>
+            <a:off x="2057400" y="632222"/>
             <a:ext cx="495300" cy="215900"/>
           </a:xfrm>
           <a:prstGeom prst="rect">
@@ -4835,7 +4840,7 @@
         </p:nvSpPr>
         <p:spPr bwMode="auto">
           <a:xfrm>
-            <a:off x="1701800" y="2519363"/>
+            <a:off x="2882900" y="2519363"/>
             <a:ext cx="495300" cy="215900"/>
           </a:xfrm>
           <a:prstGeom prst="rect">
@@ -4986,7 +4991,7 @@
         </p:nvSpPr>
         <p:spPr bwMode="auto">
           <a:xfrm>
-            <a:off x="2400300" y="2500313"/>
+            <a:off x="3581400" y="2500313"/>
             <a:ext cx="495300" cy="215900"/>
           </a:xfrm>
           <a:prstGeom prst="rect">
@@ -5135,7 +5140,7 @@
         </p:nvCxnSpPr>
         <p:spPr bwMode="auto">
           <a:xfrm rot="16200000" flipV="1">
-            <a:off x="1710532" y="245269"/>
+            <a:off x="2929732" y="245269"/>
             <a:ext cx="12700" cy="2262187"/>
           </a:xfrm>
           <a:prstGeom prst="bentConnector3">
@@ -5177,7 +5182,7 @@
         </p:nvCxnSpPr>
         <p:spPr bwMode="auto">
           <a:xfrm rot="16200000" flipV="1">
-            <a:off x="1543844" y="237331"/>
+            <a:off x="2801144" y="237331"/>
             <a:ext cx="12700" cy="2262188"/>
           </a:xfrm>
           <a:prstGeom prst="bentConnector3">
@@ -5221,7 +5226,7 @@
         </p:nvSpPr>
         <p:spPr bwMode="auto">
           <a:xfrm>
-            <a:off x="1752600" y="2922588"/>
+            <a:off x="2933700" y="2922588"/>
             <a:ext cx="1143000" cy="552450"/>
           </a:xfrm>
           <a:prstGeom prst="roundRect">
@@ -5366,7 +5371,7 @@
             </a:lvl9pPr>
           </a:lstStyle>
           <a:p>
-            <a:pPr eaLnBrk="1" hangingPunct="1">
+            <a:pPr algn="ctr" eaLnBrk="1" hangingPunct="1">
               <a:spcBef>
                 <a:spcPct val="0"/>
               </a:spcBef>
@@ -5393,8 +5398,8 @@
         </p:nvCxnSpPr>
         <p:spPr bwMode="auto">
           <a:xfrm rot="10800000">
-            <a:off x="573088" y="2514600"/>
-            <a:ext cx="1179512" cy="684213"/>
+            <a:off x="1728046" y="2514601"/>
+            <a:ext cx="1205654" cy="684213"/>
           </a:xfrm>
           <a:prstGeom prst="bentConnector2">
             <a:avLst/>
@@ -5434,8 +5439,8 @@
         </p:nvCxnSpPr>
         <p:spPr bwMode="auto">
           <a:xfrm flipV="1">
-            <a:off x="2895600" y="2513013"/>
-            <a:ext cx="1096963" cy="685800"/>
+            <a:off x="4076700" y="2513012"/>
+            <a:ext cx="1066800" cy="685801"/>
           </a:xfrm>
           <a:prstGeom prst="bentConnector2">
             <a:avLst/>
@@ -5474,7 +5479,7 @@
         </p:nvCxnSpPr>
         <p:spPr bwMode="auto">
           <a:xfrm rot="16200000" flipV="1">
-            <a:off x="1703388" y="2516188"/>
+            <a:off x="2831358" y="2509838"/>
             <a:ext cx="409575" cy="403225"/>
           </a:xfrm>
           <a:prstGeom prst="bentConnector3">
@@ -5516,7 +5521,7 @@
         </p:nvCxnSpPr>
         <p:spPr bwMode="auto">
           <a:xfrm rot="5400000" flipH="1" flipV="1">
-            <a:off x="2477294" y="2550319"/>
+            <a:off x="3627318" y="2550318"/>
             <a:ext cx="409575" cy="334963"/>
           </a:xfrm>
           <a:prstGeom prst="bentConnector3">
@@ -5557,7 +5562,7 @@
         </p:nvSpPr>
         <p:spPr bwMode="auto">
           <a:xfrm>
-            <a:off x="3468624" y="607218"/>
+            <a:off x="4649724" y="607218"/>
             <a:ext cx="914400" cy="531813"/>
           </a:xfrm>
           <a:prstGeom prst="roundRect">
@@ -5715,7 +5720,7 @@
             </a:lvl9pPr>
           </a:lstStyle>
           <a:p>
-            <a:pPr eaLnBrk="1" hangingPunct="1">
+            <a:pPr algn="ctr" eaLnBrk="1" hangingPunct="1">
               <a:spcBef>
                 <a:spcPct val="0"/>
               </a:spcBef>
@@ -5738,7 +5743,7 @@
         </p:nvSpPr>
         <p:spPr bwMode="auto">
           <a:xfrm>
-            <a:off x="3621024" y="1064418"/>
+            <a:off x="4802124" y="1064418"/>
             <a:ext cx="669925" cy="379413"/>
           </a:xfrm>
           <a:prstGeom prst="rect">
@@ -5794,7 +5799,7 @@
         </p:nvCxnSpPr>
         <p:spPr>
           <a:xfrm>
-            <a:off x="3955987" y="1443831"/>
+            <a:off x="5137087" y="1443831"/>
             <a:ext cx="6413" cy="232569"/>
           </a:xfrm>
           <a:prstGeom prst="line">
@@ -5826,7 +5831,7 @@
         </p:nvSpPr>
         <p:spPr bwMode="auto">
           <a:xfrm>
-            <a:off x="4692078" y="1661826"/>
+            <a:off x="5873178" y="1661826"/>
             <a:ext cx="890587" cy="531813"/>
           </a:xfrm>
           <a:prstGeom prst="roundRect">
@@ -5984,7 +5989,7 @@
             </a:lvl9pPr>
           </a:lstStyle>
           <a:p>
-            <a:pPr eaLnBrk="1" hangingPunct="1">
+            <a:pPr algn="ctr" eaLnBrk="1" hangingPunct="1">
               <a:spcBef>
                 <a:spcPct val="0"/>
               </a:spcBef>
@@ -6007,7 +6012,7 @@
         </p:nvSpPr>
         <p:spPr bwMode="auto">
           <a:xfrm>
-            <a:off x="4785360" y="2055527"/>
+            <a:off x="6018315" y="2133599"/>
             <a:ext cx="669925" cy="379413"/>
           </a:xfrm>
           <a:prstGeom prst="rect">
@@ -6063,8 +6068,8 @@
         </p:nvCxnSpPr>
         <p:spPr>
           <a:xfrm flipH="1">
-            <a:off x="5116738" y="2434940"/>
-            <a:ext cx="3585" cy="530114"/>
+            <a:off x="6349693" y="2513012"/>
+            <a:ext cx="3585" cy="456183"/>
           </a:xfrm>
           <a:prstGeom prst="straightConnector1">
             <a:avLst/>
@@ -6091,14 +6096,12 @@
       <p:cxnSp>
         <p:nvCxnSpPr>
           <p:cNvPr id="41" name="Straight Connector 40"/>
-          <p:cNvCxnSpPr>
-            <a:stCxn id="16" idx="2"/>
-          </p:cNvCxnSpPr>
+          <p:cNvCxnSpPr/>
           <p:nvPr/>
         </p:nvCxnSpPr>
         <p:spPr>
           <a:xfrm>
-            <a:off x="819150" y="315913"/>
+            <a:off x="2001918" y="311346"/>
             <a:ext cx="4228338" cy="0"/>
           </a:xfrm>
           <a:prstGeom prst="line">
@@ -6127,9 +6130,9 @@
           <p:nvPr/>
         </p:nvCxnSpPr>
         <p:spPr>
-          <a:xfrm>
-            <a:off x="5047488" y="330200"/>
-            <a:ext cx="0" cy="1331626"/>
+          <a:xfrm flipH="1">
+            <a:off x="6228588" y="311346"/>
+            <a:ext cx="1668" cy="1350480"/>
           </a:xfrm>
           <a:prstGeom prst="straightConnector1">
             <a:avLst/>
@@ -6156,14 +6159,12 @@
       <p:cxnSp>
         <p:nvCxnSpPr>
           <p:cNvPr id="47" name="Straight Arrow Connector 46"/>
-          <p:cNvCxnSpPr>
-            <a:stCxn id="16" idx="2"/>
-          </p:cNvCxnSpPr>
+          <p:cNvCxnSpPr/>
           <p:nvPr/>
         </p:nvCxnSpPr>
         <p:spPr>
           <a:xfrm>
-            <a:off x="819150" y="315913"/>
+            <a:off x="2001918" y="311346"/>
             <a:ext cx="0" cy="1066800"/>
           </a:xfrm>
           <a:prstGeom prst="straightConnector1">
@@ -6198,7 +6199,7 @@
         </p:nvCxnSpPr>
         <p:spPr>
           <a:xfrm>
-            <a:off x="1695624" y="405606"/>
+            <a:off x="2876724" y="405606"/>
             <a:ext cx="10939" cy="965994"/>
           </a:xfrm>
           <a:prstGeom prst="straightConnector1">
@@ -6231,7 +6232,7 @@
         </p:nvCxnSpPr>
         <p:spPr>
           <a:xfrm>
-            <a:off x="1695624" y="405606"/>
+            <a:off x="2876724" y="405606"/>
             <a:ext cx="3439938" cy="0"/>
           </a:xfrm>
           <a:prstGeom prst="line">
@@ -6263,7 +6264,7 @@
         </p:nvCxnSpPr>
         <p:spPr>
           <a:xfrm>
-            <a:off x="5135562" y="405606"/>
+            <a:off x="6316662" y="405606"/>
             <a:ext cx="1810" cy="1256220"/>
           </a:xfrm>
           <a:prstGeom prst="straightConnector1">
@@ -6296,7 +6297,7 @@
         </p:nvCxnSpPr>
         <p:spPr>
           <a:xfrm>
-            <a:off x="2933319" y="513556"/>
+            <a:off x="4114419" y="513556"/>
             <a:ext cx="0" cy="848518"/>
           </a:xfrm>
           <a:prstGeom prst="line">
@@ -6326,7 +6327,7 @@
         </p:nvCxnSpPr>
         <p:spPr>
           <a:xfrm>
-            <a:off x="2933319" y="513556"/>
+            <a:off x="4114419" y="513556"/>
             <a:ext cx="2370201" cy="0"/>
           </a:xfrm>
           <a:prstGeom prst="line">
@@ -6356,7 +6357,7 @@
         </p:nvCxnSpPr>
         <p:spPr>
           <a:xfrm>
-            <a:off x="5294376" y="513556"/>
+            <a:off x="6475476" y="513556"/>
             <a:ext cx="9144" cy="1148270"/>
           </a:xfrm>
           <a:prstGeom prst="straightConnector1">
@@ -6389,7 +6390,7 @@
         </p:nvGrpSpPr>
         <p:grpSpPr>
           <a:xfrm>
-            <a:off x="4178462" y="2965054"/>
+            <a:off x="5411417" y="2969195"/>
             <a:ext cx="1883720" cy="890776"/>
             <a:chOff x="6020816" y="3659887"/>
             <a:chExt cx="1883720" cy="890776"/>
@@ -6783,6 +6784,609 @@
           </p:sp>
         </p:grpSp>
       </p:grpSp>
+      <p:sp>
+        <p:nvSpPr>
+          <p:cNvPr id="60" name="AutoShape 59"/>
+          <p:cNvSpPr>
+            <a:spLocks noChangeArrowheads="1"/>
+          </p:cNvSpPr>
+          <p:nvPr/>
+        </p:nvSpPr>
+        <p:spPr bwMode="auto">
+          <a:xfrm>
+            <a:off x="155921" y="1666874"/>
+            <a:ext cx="890587" cy="531813"/>
+          </a:xfrm>
+          <a:prstGeom prst="roundRect">
+            <a:avLst>
+              <a:gd name="adj" fmla="val 16667"/>
+            </a:avLst>
+          </a:prstGeom>
+          <a:solidFill>
+            <a:srgbClr val="C0C0C0"/>
+          </a:solidFill>
+          <a:ln w="9525">
+            <a:solidFill>
+              <a:schemeClr val="tx1"/>
+            </a:solidFill>
+            <a:prstDash val="dash"/>
+            <a:round/>
+            <a:headEnd/>
+            <a:tailEnd/>
+          </a:ln>
+          <a:effectLst/>
+          <a:extLst>
+            <a:ext uri="{AF507438-7753-43E0-B8FC-AC1667EBCBE1}">
+              <a14:hiddenEffects xmlns:a14="http://schemas.microsoft.com/office/drawing/2010/main">
+                <a:effectLst>
+                  <a:outerShdw dist="35921" dir="2700000" algn="ctr" rotWithShape="0">
+                    <a:schemeClr val="bg2"/>
+                  </a:outerShdw>
+                </a:effectLst>
+              </a14:hiddenEffects>
+            </a:ext>
+          </a:extLst>
+        </p:spPr>
+        <p:txBody>
+          <a:bodyPr wrap="none" anchor="ctr"/>
+          <a:lstStyle>
+            <a:lvl1pPr>
+              <a:spcBef>
+                <a:spcPct val="20000"/>
+              </a:spcBef>
+              <a:buChar char="•"/>
+              <a:defRPr sz="1700">
+                <a:solidFill>
+                  <a:schemeClr val="tx1"/>
+                </a:solidFill>
+                <a:latin typeface="Arial" panose="020B0604020202020204" pitchFamily="34" charset="0"/>
+              </a:defRPr>
+            </a:lvl1pPr>
+            <a:lvl2pPr marL="742950" indent="-285750">
+              <a:spcBef>
+                <a:spcPct val="20000"/>
+              </a:spcBef>
+              <a:buChar char="–"/>
+              <a:defRPr sz="1500">
+                <a:solidFill>
+                  <a:schemeClr val="tx1"/>
+                </a:solidFill>
+                <a:latin typeface="Arial" panose="020B0604020202020204" pitchFamily="34" charset="0"/>
+              </a:defRPr>
+            </a:lvl2pPr>
+            <a:lvl3pPr marL="1143000" indent="-228600">
+              <a:spcBef>
+                <a:spcPct val="20000"/>
+              </a:spcBef>
+              <a:buChar char="•"/>
+              <a:defRPr sz="1300">
+                <a:solidFill>
+                  <a:schemeClr val="tx1"/>
+                </a:solidFill>
+                <a:latin typeface="Arial" panose="020B0604020202020204" pitchFamily="34" charset="0"/>
+              </a:defRPr>
+            </a:lvl3pPr>
+            <a:lvl4pPr marL="1600200" indent="-228600">
+              <a:spcBef>
+                <a:spcPct val="20000"/>
+              </a:spcBef>
+              <a:buChar char="–"/>
+              <a:defRPr sz="1100">
+                <a:solidFill>
+                  <a:schemeClr val="tx1"/>
+                </a:solidFill>
+                <a:latin typeface="Arial" panose="020B0604020202020204" pitchFamily="34" charset="0"/>
+              </a:defRPr>
+            </a:lvl4pPr>
+            <a:lvl5pPr marL="2057400" indent="-228600">
+              <a:spcBef>
+                <a:spcPct val="20000"/>
+              </a:spcBef>
+              <a:buChar char="»"/>
+              <a:defRPr sz="1100">
+                <a:solidFill>
+                  <a:schemeClr val="tx1"/>
+                </a:solidFill>
+                <a:latin typeface="Arial" panose="020B0604020202020204" pitchFamily="34" charset="0"/>
+              </a:defRPr>
+            </a:lvl5pPr>
+            <a:lvl6pPr marL="2514600" indent="-228600" eaLnBrk="0" fontAlgn="base" hangingPunct="0">
+              <a:spcBef>
+                <a:spcPct val="20000"/>
+              </a:spcBef>
+              <a:spcAft>
+                <a:spcPct val="0"/>
+              </a:spcAft>
+              <a:buChar char="»"/>
+              <a:defRPr sz="1100">
+                <a:solidFill>
+                  <a:schemeClr val="tx1"/>
+                </a:solidFill>
+                <a:latin typeface="Arial" panose="020B0604020202020204" pitchFamily="34" charset="0"/>
+              </a:defRPr>
+            </a:lvl6pPr>
+            <a:lvl7pPr marL="2971800" indent="-228600" eaLnBrk="0" fontAlgn="base" hangingPunct="0">
+              <a:spcBef>
+                <a:spcPct val="20000"/>
+              </a:spcBef>
+              <a:spcAft>
+                <a:spcPct val="0"/>
+              </a:spcAft>
+              <a:buChar char="»"/>
+              <a:defRPr sz="1100">
+                <a:solidFill>
+                  <a:schemeClr val="tx1"/>
+                </a:solidFill>
+                <a:latin typeface="Arial" panose="020B0604020202020204" pitchFamily="34" charset="0"/>
+              </a:defRPr>
+            </a:lvl7pPr>
+            <a:lvl8pPr marL="3429000" indent="-228600" eaLnBrk="0" fontAlgn="base" hangingPunct="0">
+              <a:spcBef>
+                <a:spcPct val="20000"/>
+              </a:spcBef>
+              <a:spcAft>
+                <a:spcPct val="0"/>
+              </a:spcAft>
+              <a:buChar char="»"/>
+              <a:defRPr sz="1100">
+                <a:solidFill>
+                  <a:schemeClr val="tx1"/>
+                </a:solidFill>
+                <a:latin typeface="Arial" panose="020B0604020202020204" pitchFamily="34" charset="0"/>
+              </a:defRPr>
+            </a:lvl8pPr>
+            <a:lvl9pPr marL="3886200" indent="-228600" eaLnBrk="0" fontAlgn="base" hangingPunct="0">
+              <a:spcBef>
+                <a:spcPct val="20000"/>
+              </a:spcBef>
+              <a:spcAft>
+                <a:spcPct val="0"/>
+              </a:spcAft>
+              <a:buChar char="»"/>
+              <a:defRPr sz="1100">
+                <a:solidFill>
+                  <a:schemeClr val="tx1"/>
+                </a:solidFill>
+                <a:latin typeface="Arial" panose="020B0604020202020204" pitchFamily="34" charset="0"/>
+              </a:defRPr>
+            </a:lvl9pPr>
+          </a:lstStyle>
+          <a:p>
+            <a:pPr algn="ctr" eaLnBrk="1" hangingPunct="1">
+              <a:spcBef>
+                <a:spcPct val="0"/>
+              </a:spcBef>
+              <a:buFontTx/>
+              <a:buNone/>
+            </a:pPr>
+            <a:r>
+              <a:rPr lang="de-DE" altLang="de-DE" sz="800" b="1" dirty="0" err="1" smtClean="0"/>
+              <a:t>oscm</a:t>
+            </a:r>
+            <a:r>
+              <a:rPr lang="de-DE" altLang="de-DE" sz="800" b="1" dirty="0" smtClean="0"/>
+              <a:t>-identity</a:t>
+            </a:r>
+            <a:endParaRPr lang="en-US" altLang="de-DE" sz="800" dirty="0"/>
+          </a:p>
+        </p:txBody>
+      </p:sp>
+      <p:sp>
+        <p:nvSpPr>
+          <p:cNvPr id="61" name="Rectangle 60"/>
+          <p:cNvSpPr/>
+          <p:nvPr/>
+        </p:nvSpPr>
+        <p:spPr bwMode="auto">
+          <a:xfrm>
+            <a:off x="259738" y="2127250"/>
+            <a:ext cx="669925" cy="379412"/>
+          </a:xfrm>
+          <a:prstGeom prst="rect">
+            <a:avLst/>
+          </a:prstGeom>
+          <a:solidFill>
+            <a:schemeClr val="accent3"/>
+          </a:solidFill>
+          <a:ln w="9525" cap="flat" cmpd="sng" algn="ctr">
+            <a:solidFill>
+              <a:schemeClr val="tx1"/>
+            </a:solidFill>
+            <a:prstDash val="solid"/>
+            <a:round/>
+            <a:headEnd type="none" w="med" len="med"/>
+            <a:tailEnd type="none" w="med" len="med"/>
+          </a:ln>
+          <a:effectLst/>
+          <a:extLst/>
+        </p:spPr>
+        <p:txBody>
+          <a:bodyPr/>
+          <a:lstStyle/>
+          <a:p>
+            <a:pPr eaLnBrk="1" hangingPunct="1">
+              <a:defRPr/>
+            </a:pPr>
+            <a:r>
+              <a:rPr lang="de-DE" altLang="de-DE" sz="800" b="1" dirty="0"/>
+              <a:t>FQDN / IP</a:t>
+            </a:r>
+          </a:p>
+          <a:p>
+            <a:pPr eaLnBrk="1" hangingPunct="1">
+              <a:defRPr/>
+            </a:pPr>
+            <a:r>
+              <a:rPr lang="de-DE" altLang="de-DE" sz="800" b="1" dirty="0" smtClean="0"/>
+              <a:t>9091</a:t>
+            </a:r>
+            <a:endParaRPr lang="de-DE" altLang="de-DE" sz="800" b="1" dirty="0"/>
+          </a:p>
+        </p:txBody>
+      </p:sp>
+      <p:sp>
+        <p:nvSpPr>
+          <p:cNvPr id="63" name="Rectangle 62"/>
+          <p:cNvSpPr/>
+          <p:nvPr/>
+        </p:nvSpPr>
+        <p:spPr bwMode="auto">
+          <a:xfrm>
+            <a:off x="206757" y="1370012"/>
+            <a:ext cx="815939" cy="371475"/>
+          </a:xfrm>
+          <a:prstGeom prst="rect">
+            <a:avLst/>
+          </a:prstGeom>
+          <a:solidFill>
+            <a:schemeClr val="accent3"/>
+          </a:solidFill>
+          <a:ln w="9525" cap="flat" cmpd="sng" algn="ctr">
+            <a:solidFill>
+              <a:schemeClr val="tx1"/>
+            </a:solidFill>
+            <a:prstDash val="solid"/>
+            <a:round/>
+            <a:headEnd type="none" w="med" len="med"/>
+            <a:tailEnd type="none" w="med" len="med"/>
+          </a:ln>
+          <a:effectLst/>
+          <a:extLst/>
+        </p:spPr>
+        <p:txBody>
+          <a:bodyPr/>
+          <a:lstStyle/>
+          <a:p>
+            <a:pPr eaLnBrk="1" hangingPunct="1">
+              <a:defRPr/>
+            </a:pPr>
+            <a:r>
+              <a:rPr lang="de-DE" altLang="de-DE" sz="800" b="1" dirty="0" err="1" smtClean="0"/>
+              <a:t>oscm</a:t>
+            </a:r>
+            <a:r>
+              <a:rPr lang="de-DE" altLang="de-DE" sz="800" b="1" dirty="0" smtClean="0"/>
+              <a:t>-identity</a:t>
+            </a:r>
+            <a:endParaRPr lang="de-DE" altLang="de-DE" sz="800" b="1" dirty="0"/>
+          </a:p>
+          <a:p>
+            <a:pPr eaLnBrk="1" hangingPunct="1">
+              <a:defRPr/>
+            </a:pPr>
+            <a:r>
+              <a:rPr lang="de-DE" altLang="de-DE" sz="800" b="1" dirty="0" smtClean="0"/>
+              <a:t>9090</a:t>
+            </a:r>
+            <a:endParaRPr lang="de-DE" altLang="de-DE" sz="800" b="1" dirty="0"/>
+          </a:p>
+        </p:txBody>
+      </p:sp>
+      <p:cxnSp>
+        <p:nvCxnSpPr>
+          <p:cNvPr id="73" name="Elbow Connector 72"/>
+          <p:cNvCxnSpPr/>
+          <p:nvPr/>
+        </p:nvCxnSpPr>
+        <p:spPr bwMode="auto">
+          <a:xfrm rot="10800000">
+            <a:off x="582977" y="1363662"/>
+            <a:ext cx="969598" cy="4764"/>
+          </a:xfrm>
+          <a:prstGeom prst="bentConnector4">
+            <a:avLst>
+              <a:gd name="adj1" fmla="val 146"/>
+              <a:gd name="adj2" fmla="val 9830269"/>
+            </a:avLst>
+          </a:prstGeom>
+          <a:ln w="9525" cap="flat" cmpd="sng" algn="ctr">
+            <a:solidFill>
+              <a:schemeClr val="accent4"/>
+            </a:solidFill>
+            <a:prstDash val="solid"/>
+            <a:round/>
+            <a:headEnd type="arrow" w="med" len="med"/>
+            <a:tailEnd type="arrow" w="med" len="med"/>
+          </a:ln>
+          <a:extLst/>
+        </p:spPr>
+        <p:style>
+          <a:lnRef idx="0">
+            <a:scrgbClr r="0" g="0" b="0"/>
+          </a:lnRef>
+          <a:fillRef idx="0">
+            <a:scrgbClr r="0" g="0" b="0"/>
+          </a:fillRef>
+          <a:effectRef idx="0">
+            <a:scrgbClr r="0" g="0" b="0"/>
+          </a:effectRef>
+          <a:fontRef idx="minor">
+            <a:schemeClr val="tx1"/>
+          </a:fontRef>
+        </p:style>
+      </p:cxnSp>
+      <p:sp>
+        <p:nvSpPr>
+          <p:cNvPr id="104" name="AutoShape 2"/>
+          <p:cNvSpPr>
+            <a:spLocks noChangeArrowheads="1"/>
+          </p:cNvSpPr>
+          <p:nvPr/>
+        </p:nvSpPr>
+        <p:spPr bwMode="auto">
+          <a:xfrm>
+            <a:off x="155921" y="2921346"/>
+            <a:ext cx="886324" cy="552450"/>
+          </a:xfrm>
+          <a:prstGeom prst="roundRect">
+            <a:avLst>
+              <a:gd name="adj" fmla="val 16667"/>
+            </a:avLst>
+          </a:prstGeom>
+          <a:solidFill>
+            <a:srgbClr val="EAEAEA"/>
+          </a:solidFill>
+          <a:ln w="9525">
+            <a:solidFill>
+              <a:schemeClr val="tx1"/>
+            </a:solidFill>
+            <a:round/>
+            <a:headEnd/>
+            <a:tailEnd/>
+          </a:ln>
+        </p:spPr>
+        <p:txBody>
+          <a:bodyPr wrap="none" anchor="ctr"/>
+          <a:lstStyle>
+            <a:lvl1pPr>
+              <a:spcBef>
+                <a:spcPct val="20000"/>
+              </a:spcBef>
+              <a:buChar char="•"/>
+              <a:defRPr sz="1700">
+                <a:solidFill>
+                  <a:schemeClr val="tx1"/>
+                </a:solidFill>
+                <a:latin typeface="Arial" panose="020B0604020202020204" pitchFamily="34" charset="0"/>
+              </a:defRPr>
+            </a:lvl1pPr>
+            <a:lvl2pPr marL="742950" indent="-285750">
+              <a:spcBef>
+                <a:spcPct val="20000"/>
+              </a:spcBef>
+              <a:buChar char="–"/>
+              <a:defRPr sz="1500">
+                <a:solidFill>
+                  <a:schemeClr val="tx1"/>
+                </a:solidFill>
+                <a:latin typeface="Arial" panose="020B0604020202020204" pitchFamily="34" charset="0"/>
+              </a:defRPr>
+            </a:lvl2pPr>
+            <a:lvl3pPr marL="1143000" indent="-228600">
+              <a:spcBef>
+                <a:spcPct val="20000"/>
+              </a:spcBef>
+              <a:buChar char="•"/>
+              <a:defRPr sz="1300">
+                <a:solidFill>
+                  <a:schemeClr val="tx1"/>
+                </a:solidFill>
+                <a:latin typeface="Arial" panose="020B0604020202020204" pitchFamily="34" charset="0"/>
+              </a:defRPr>
+            </a:lvl3pPr>
+            <a:lvl4pPr marL="1600200" indent="-228600">
+              <a:spcBef>
+                <a:spcPct val="20000"/>
+              </a:spcBef>
+              <a:buChar char="–"/>
+              <a:defRPr sz="1100">
+                <a:solidFill>
+                  <a:schemeClr val="tx1"/>
+                </a:solidFill>
+                <a:latin typeface="Arial" panose="020B0604020202020204" pitchFamily="34" charset="0"/>
+              </a:defRPr>
+            </a:lvl4pPr>
+            <a:lvl5pPr marL="2057400" indent="-228600">
+              <a:spcBef>
+                <a:spcPct val="20000"/>
+              </a:spcBef>
+              <a:buChar char="»"/>
+              <a:defRPr sz="1100">
+                <a:solidFill>
+                  <a:schemeClr val="tx1"/>
+                </a:solidFill>
+                <a:latin typeface="Arial" panose="020B0604020202020204" pitchFamily="34" charset="0"/>
+              </a:defRPr>
+            </a:lvl5pPr>
+            <a:lvl6pPr marL="2514600" indent="-228600" eaLnBrk="0" fontAlgn="base" hangingPunct="0">
+              <a:spcBef>
+                <a:spcPct val="20000"/>
+              </a:spcBef>
+              <a:spcAft>
+                <a:spcPct val="0"/>
+              </a:spcAft>
+              <a:buChar char="»"/>
+              <a:defRPr sz="1100">
+                <a:solidFill>
+                  <a:schemeClr val="tx1"/>
+                </a:solidFill>
+                <a:latin typeface="Arial" panose="020B0604020202020204" pitchFamily="34" charset="0"/>
+              </a:defRPr>
+            </a:lvl6pPr>
+            <a:lvl7pPr marL="2971800" indent="-228600" eaLnBrk="0" fontAlgn="base" hangingPunct="0">
+              <a:spcBef>
+                <a:spcPct val="20000"/>
+              </a:spcBef>
+              <a:spcAft>
+                <a:spcPct val="0"/>
+              </a:spcAft>
+              <a:buChar char="»"/>
+              <a:defRPr sz="1100">
+                <a:solidFill>
+                  <a:schemeClr val="tx1"/>
+                </a:solidFill>
+                <a:latin typeface="Arial" panose="020B0604020202020204" pitchFamily="34" charset="0"/>
+              </a:defRPr>
+            </a:lvl7pPr>
+            <a:lvl8pPr marL="3429000" indent="-228600" eaLnBrk="0" fontAlgn="base" hangingPunct="0">
+              <a:spcBef>
+                <a:spcPct val="20000"/>
+              </a:spcBef>
+              <a:spcAft>
+                <a:spcPct val="0"/>
+              </a:spcAft>
+              <a:buChar char="»"/>
+              <a:defRPr sz="1100">
+                <a:solidFill>
+                  <a:schemeClr val="tx1"/>
+                </a:solidFill>
+                <a:latin typeface="Arial" panose="020B0604020202020204" pitchFamily="34" charset="0"/>
+              </a:defRPr>
+            </a:lvl8pPr>
+            <a:lvl9pPr marL="3886200" indent="-228600" eaLnBrk="0" fontAlgn="base" hangingPunct="0">
+              <a:spcBef>
+                <a:spcPct val="20000"/>
+              </a:spcBef>
+              <a:spcAft>
+                <a:spcPct val="0"/>
+              </a:spcAft>
+              <a:buChar char="»"/>
+              <a:defRPr sz="1100">
+                <a:solidFill>
+                  <a:schemeClr val="tx1"/>
+                </a:solidFill>
+                <a:latin typeface="Arial" panose="020B0604020202020204" pitchFamily="34" charset="0"/>
+              </a:defRPr>
+            </a:lvl9pPr>
+          </a:lstStyle>
+          <a:p>
+            <a:pPr algn="ctr" eaLnBrk="1" hangingPunct="1">
+              <a:spcBef>
+                <a:spcPct val="0"/>
+              </a:spcBef>
+              <a:buFontTx/>
+              <a:buNone/>
+            </a:pPr>
+            <a:r>
+              <a:rPr lang="de-DE" altLang="de-DE" sz="800" b="1" dirty="0" err="1" smtClean="0"/>
+              <a:t>Authorization</a:t>
+            </a:r>
+            <a:endParaRPr lang="de-DE" altLang="de-DE" sz="800" b="1" dirty="0" smtClean="0"/>
+          </a:p>
+          <a:p>
+            <a:pPr algn="ctr" eaLnBrk="1" hangingPunct="1">
+              <a:spcBef>
+                <a:spcPct val="0"/>
+              </a:spcBef>
+              <a:buFontTx/>
+              <a:buNone/>
+            </a:pPr>
+            <a:r>
+              <a:rPr lang="de-DE" altLang="de-DE" sz="800" b="1" dirty="0" smtClean="0"/>
+              <a:t>Server</a:t>
+            </a:r>
+            <a:endParaRPr lang="en-US" altLang="de-DE" sz="800" dirty="0"/>
+          </a:p>
+        </p:txBody>
+      </p:sp>
+      <p:cxnSp>
+        <p:nvCxnSpPr>
+          <p:cNvPr id="111" name="Straight Arrow Connector 110"/>
+          <p:cNvCxnSpPr>
+            <a:stCxn id="61" idx="2"/>
+            <a:endCxn id="104" idx="0"/>
+          </p:cNvCxnSpPr>
+          <p:nvPr/>
+        </p:nvCxnSpPr>
+        <p:spPr>
+          <a:xfrm>
+            <a:off x="594701" y="2506662"/>
+            <a:ext cx="4382" cy="414684"/>
+          </a:xfrm>
+          <a:prstGeom prst="straightConnector1">
+            <a:avLst/>
+          </a:prstGeom>
+          <a:ln>
+            <a:solidFill>
+              <a:schemeClr val="tx1"/>
+            </a:solidFill>
+            <a:headEnd type="triangle"/>
+            <a:tailEnd type="triangle"/>
+          </a:ln>
+        </p:spPr>
+        <p:style>
+          <a:lnRef idx="1">
+            <a:schemeClr val="accent1"/>
+          </a:lnRef>
+          <a:fillRef idx="0">
+            <a:schemeClr val="accent1"/>
+          </a:fillRef>
+          <a:effectRef idx="0">
+            <a:schemeClr val="accent1"/>
+          </a:effectRef>
+          <a:fontRef idx="minor">
+            <a:schemeClr val="tx1"/>
+          </a:fontRef>
+        </p:style>
+      </p:cxnSp>
+      <p:cxnSp>
+        <p:nvCxnSpPr>
+          <p:cNvPr id="119" name="Straight Arrow Connector 118"/>
+          <p:cNvCxnSpPr>
+            <a:endCxn id="104" idx="3"/>
+          </p:cNvCxnSpPr>
+          <p:nvPr/>
+        </p:nvCxnSpPr>
+        <p:spPr>
+          <a:xfrm flipH="1">
+            <a:off x="1042245" y="3197571"/>
+            <a:ext cx="684161" cy="0"/>
+          </a:xfrm>
+          <a:prstGeom prst="straightConnector1">
+            <a:avLst/>
+          </a:prstGeom>
+          <a:ln>
+            <a:solidFill>
+              <a:schemeClr val="tx1"/>
+            </a:solidFill>
+            <a:tailEnd type="triangle"/>
+          </a:ln>
+        </p:spPr>
+        <p:style>
+          <a:lnRef idx="1">
+            <a:schemeClr val="accent1"/>
+          </a:lnRef>
+          <a:fillRef idx="0">
+            <a:schemeClr val="accent1"/>
+          </a:fillRef>
+          <a:effectRef idx="0">
+            <a:schemeClr val="accent1"/>
+          </a:effectRef>
+          <a:fontRef idx="minor">
+            <a:schemeClr val="tx1"/>
+          </a:fontRef>
+        </p:style>
+      </p:cxnSp>
     </p:spTree>
     <p:extLst>
       <p:ext uri="{BB962C8B-B14F-4D97-AF65-F5344CB8AC3E}">
@@ -6813,6 +7417,36 @@
           <a:chExt cx="0" cy="0"/>
         </a:xfrm>
       </p:grpSpPr>
+      <p:cxnSp>
+        <p:nvCxnSpPr>
+          <p:cNvPr id="42" name="Straight Connector 41"/>
+          <p:cNvCxnSpPr/>
+          <p:nvPr/>
+        </p:nvCxnSpPr>
+        <p:spPr>
+          <a:xfrm>
+            <a:off x="5058383" y="1620850"/>
+            <a:ext cx="1587" cy="230201"/>
+          </a:xfrm>
+          <a:prstGeom prst="line">
+            <a:avLst/>
+          </a:prstGeom>
+        </p:spPr>
+        <p:style>
+          <a:lnRef idx="1">
+            <a:schemeClr val="dk1"/>
+          </a:lnRef>
+          <a:fillRef idx="0">
+            <a:schemeClr val="dk1"/>
+          </a:fillRef>
+          <a:effectRef idx="0">
+            <a:schemeClr val="dk1"/>
+          </a:effectRef>
+          <a:fontRef idx="minor">
+            <a:schemeClr val="tx1"/>
+          </a:fontRef>
+        </p:style>
+      </p:cxnSp>
       <p:sp>
         <p:nvSpPr>
           <p:cNvPr id="4" name="Rectangle 100"/>
@@ -6823,8 +7457,8 @@
         </p:nvSpPr>
         <p:spPr bwMode="auto">
           <a:xfrm>
-            <a:off x="187287" y="246888"/>
-            <a:ext cx="6051588" cy="1953387"/>
+            <a:off x="198120" y="91440"/>
+            <a:ext cx="6310255" cy="2108835"/>
           </a:xfrm>
           <a:prstGeom prst="rect">
             <a:avLst/>
@@ -6965,8 +7599,8 @@
         </p:nvSpPr>
         <p:spPr bwMode="auto">
           <a:xfrm>
-            <a:off x="2297910" y="1103326"/>
-            <a:ext cx="890588" cy="531813"/>
+            <a:off x="2931405" y="1098827"/>
+            <a:ext cx="736023" cy="531813"/>
           </a:xfrm>
           <a:prstGeom prst="roundRect">
             <a:avLst>
@@ -7123,7 +7757,7 @@
             </a:lvl9pPr>
           </a:lstStyle>
           <a:p>
-            <a:pPr eaLnBrk="1" hangingPunct="1">
+            <a:pPr algn="ctr" eaLnBrk="1" hangingPunct="1">
               <a:spcBef>
                 <a:spcPct val="0"/>
               </a:spcBef>
@@ -7148,8 +7782,8 @@
         </p:nvSpPr>
         <p:spPr bwMode="auto">
           <a:xfrm>
-            <a:off x="286544" y="1100144"/>
-            <a:ext cx="890587" cy="531813"/>
+            <a:off x="318106" y="1100144"/>
+            <a:ext cx="736023" cy="531813"/>
           </a:xfrm>
           <a:prstGeom prst="roundRect">
             <a:avLst>
@@ -7306,7 +7940,7 @@
             </a:lvl9pPr>
           </a:lstStyle>
           <a:p>
-            <a:pPr eaLnBrk="1" hangingPunct="1">
+            <a:pPr algn="ctr" eaLnBrk="1" hangingPunct="1">
               <a:spcBef>
                 <a:spcPct val="0"/>
               </a:spcBef>
@@ -7314,10 +7948,14 @@
               <a:buNone/>
             </a:pPr>
             <a:r>
-              <a:rPr lang="de-DE" altLang="de-DE" sz="800" b="1"/>
-              <a:t>oscm-core</a:t>
-            </a:r>
-            <a:endParaRPr lang="en-US" altLang="de-DE" sz="800"/>
+              <a:rPr lang="de-DE" altLang="de-DE" sz="800" b="1" dirty="0" err="1"/>
+              <a:t>oscm</a:t>
+            </a:r>
+            <a:r>
+              <a:rPr lang="de-DE" altLang="de-DE" sz="800" b="1" dirty="0"/>
+              <a:t>-core</a:t>
+            </a:r>
+            <a:endParaRPr lang="en-US" altLang="de-DE" sz="800" dirty="0"/>
           </a:p>
         </p:txBody>
       </p:sp>
@@ -7331,8 +7969,8 @@
         </p:nvSpPr>
         <p:spPr bwMode="auto">
           <a:xfrm>
-            <a:off x="3286126" y="1100143"/>
-            <a:ext cx="890588" cy="531813"/>
+            <a:off x="3802103" y="1110057"/>
+            <a:ext cx="736023" cy="531813"/>
           </a:xfrm>
           <a:prstGeom prst="roundRect">
             <a:avLst>
@@ -7489,7 +8127,7 @@
             </a:lvl9pPr>
           </a:lstStyle>
           <a:p>
-            <a:pPr eaLnBrk="1" hangingPunct="1">
+            <a:pPr algn="ctr" eaLnBrk="1" hangingPunct="1">
               <a:spcBef>
                 <a:spcPct val="0"/>
               </a:spcBef>
@@ -7514,8 +8152,8 @@
         </p:nvSpPr>
         <p:spPr bwMode="auto">
           <a:xfrm>
-            <a:off x="4255290" y="1100142"/>
-            <a:ext cx="914400" cy="531813"/>
+            <a:off x="4672855" y="1110057"/>
+            <a:ext cx="779987" cy="531813"/>
           </a:xfrm>
           <a:prstGeom prst="roundRect">
             <a:avLst>
@@ -7672,7 +8310,7 @@
             </a:lvl9pPr>
           </a:lstStyle>
           <a:p>
-            <a:pPr eaLnBrk="1" hangingPunct="1">
+            <a:pPr algn="ctr" eaLnBrk="1" hangingPunct="1">
               <a:spcBef>
                 <a:spcPct val="0"/>
               </a:spcBef>
@@ -7697,7 +8335,7 @@
         </p:nvSpPr>
         <p:spPr bwMode="auto">
           <a:xfrm>
-            <a:off x="263787" y="339546"/>
+            <a:off x="198120" y="99875"/>
             <a:ext cx="1447800" cy="246063"/>
           </a:xfrm>
           <a:prstGeom prst="rect">
@@ -7833,8 +8471,13 @@
             <a:pPr eaLnBrk="1" hangingPunct="1"/>
             <a:r>
               <a:rPr lang="de-DE" altLang="de-DE" b="1" dirty="0"/>
-              <a:t>Docker Host (VM)</a:t>
-            </a:r>
+              <a:t>Docker </a:t>
+            </a:r>
+            <a:r>
+              <a:rPr lang="de-DE" altLang="de-DE" b="1" dirty="0" smtClean="0"/>
+              <a:t>Host</a:t>
+            </a:r>
+            <a:endParaRPr lang="de-DE" altLang="de-DE" b="1" dirty="0"/>
           </a:p>
         </p:txBody>
       </p:sp>
@@ -7848,8 +8491,8 @@
         </p:nvSpPr>
         <p:spPr bwMode="auto">
           <a:xfrm>
-            <a:off x="286544" y="1862158"/>
-            <a:ext cx="5877700" cy="228580"/>
+            <a:off x="286544" y="1848672"/>
+            <a:ext cx="6099572" cy="242066"/>
           </a:xfrm>
           <a:prstGeom prst="roundRect">
             <a:avLst>
@@ -8018,8 +8661,8 @@
         </p:nvSpPr>
         <p:spPr bwMode="auto">
           <a:xfrm>
-            <a:off x="5249844" y="1100141"/>
-            <a:ext cx="914400" cy="531813"/>
+            <a:off x="5584693" y="1100141"/>
+            <a:ext cx="755703" cy="531813"/>
           </a:xfrm>
           <a:prstGeom prst="roundRect">
             <a:avLst>
@@ -8176,7 +8819,7 @@
             </a:lvl9pPr>
           </a:lstStyle>
           <a:p>
-            <a:pPr eaLnBrk="1" hangingPunct="1">
+            <a:pPr algn="ctr" eaLnBrk="1" hangingPunct="1">
               <a:spcBef>
                 <a:spcPct val="0"/>
               </a:spcBef>
@@ -8201,8 +8844,8 @@
         </p:nvSpPr>
         <p:spPr bwMode="auto">
           <a:xfrm>
-            <a:off x="1289041" y="1100141"/>
-            <a:ext cx="890587" cy="531813"/>
+            <a:off x="1183410" y="1094996"/>
+            <a:ext cx="736023" cy="531813"/>
           </a:xfrm>
           <a:prstGeom prst="roundRect">
             <a:avLst>
@@ -8359,7 +9002,7 @@
             </a:lvl9pPr>
           </a:lstStyle>
           <a:p>
-            <a:pPr eaLnBrk="1" hangingPunct="1">
+            <a:pPr algn="ctr" eaLnBrk="1" hangingPunct="1">
               <a:spcBef>
                 <a:spcPct val="0"/>
               </a:spcBef>
@@ -8384,7 +9027,7 @@
         </p:nvCxnSpPr>
         <p:spPr>
           <a:xfrm>
-            <a:off x="731838" y="1631957"/>
+            <a:off x="686118" y="1631957"/>
             <a:ext cx="1587" cy="230201"/>
           </a:xfrm>
           <a:prstGeom prst="line">
@@ -8414,7 +9057,7 @@
         </p:nvCxnSpPr>
         <p:spPr>
           <a:xfrm>
-            <a:off x="1733553" y="1627188"/>
+            <a:off x="1558430" y="1622109"/>
             <a:ext cx="1587" cy="230201"/>
           </a:xfrm>
           <a:prstGeom prst="line">
@@ -8444,7 +9087,7 @@
         </p:nvCxnSpPr>
         <p:spPr>
           <a:xfrm>
-            <a:off x="2736845" y="1620851"/>
+            <a:off x="2423228" y="1621660"/>
             <a:ext cx="1587" cy="230201"/>
           </a:xfrm>
           <a:prstGeom prst="line">
@@ -8474,37 +9117,7 @@
         </p:nvCxnSpPr>
         <p:spPr>
           <a:xfrm>
-            <a:off x="3738550" y="1627193"/>
-            <a:ext cx="1587" cy="230201"/>
-          </a:xfrm>
-          <a:prstGeom prst="line">
-            <a:avLst/>
-          </a:prstGeom>
-        </p:spPr>
-        <p:style>
-          <a:lnRef idx="1">
-            <a:schemeClr val="dk1"/>
-          </a:lnRef>
-          <a:fillRef idx="0">
-            <a:schemeClr val="dk1"/>
-          </a:fillRef>
-          <a:effectRef idx="0">
-            <a:schemeClr val="dk1"/>
-          </a:effectRef>
-          <a:fontRef idx="minor">
-            <a:schemeClr val="tx1"/>
-          </a:fontRef>
-        </p:style>
-      </p:cxnSp>
-      <p:cxnSp>
-        <p:nvCxnSpPr>
-          <p:cNvPr id="42" name="Straight Connector 41"/>
-          <p:cNvCxnSpPr/>
-          <p:nvPr/>
-        </p:nvCxnSpPr>
-        <p:spPr>
-          <a:xfrm>
-            <a:off x="4738668" y="1620850"/>
+            <a:off x="4161750" y="1627596"/>
             <a:ext cx="1587" cy="230201"/>
           </a:xfrm>
           <a:prstGeom prst="line">
@@ -8534,7 +9147,7 @@
         </p:nvCxnSpPr>
         <p:spPr>
           <a:xfrm>
-            <a:off x="5741961" y="1620850"/>
+            <a:off x="5986542" y="1620850"/>
             <a:ext cx="1587" cy="230201"/>
           </a:xfrm>
           <a:prstGeom prst="line">
@@ -8594,7 +9207,7 @@
         </p:nvCxnSpPr>
         <p:spPr>
           <a:xfrm>
-            <a:off x="1733553" y="2089938"/>
+            <a:off x="1573230" y="2092811"/>
             <a:ext cx="1587" cy="230201"/>
           </a:xfrm>
           <a:prstGeom prst="line">
@@ -8624,7 +9237,7 @@
         </p:nvCxnSpPr>
         <p:spPr>
           <a:xfrm>
-            <a:off x="2736845" y="2083601"/>
+            <a:off x="2417796" y="2090080"/>
             <a:ext cx="1587" cy="230201"/>
           </a:xfrm>
           <a:prstGeom prst="line">
@@ -8654,7 +9267,7 @@
         </p:nvCxnSpPr>
         <p:spPr>
           <a:xfrm>
-            <a:off x="3738550" y="2089943"/>
+            <a:off x="3295906" y="2088731"/>
             <a:ext cx="1587" cy="230201"/>
           </a:xfrm>
           <a:prstGeom prst="line">
@@ -8684,7 +9297,7 @@
         </p:nvCxnSpPr>
         <p:spPr>
           <a:xfrm>
-            <a:off x="4738668" y="2083600"/>
+            <a:off x="5058383" y="2092812"/>
             <a:ext cx="1587" cy="230201"/>
           </a:xfrm>
           <a:prstGeom prst="line">
@@ -8714,7 +9327,7 @@
         </p:nvCxnSpPr>
         <p:spPr>
           <a:xfrm>
-            <a:off x="5741961" y="2083600"/>
+            <a:off x="5985748" y="2092813"/>
             <a:ext cx="1587" cy="230201"/>
           </a:xfrm>
           <a:prstGeom prst="line">
@@ -8743,9 +9356,9 @@
           <p:nvPr/>
         </p:nvCxnSpPr>
         <p:spPr>
-          <a:xfrm>
-            <a:off x="731838" y="2324908"/>
-            <a:ext cx="5010123" cy="0"/>
+          <a:xfrm flipV="1">
+            <a:off x="731838" y="2313801"/>
+            <a:ext cx="5253910" cy="11107"/>
           </a:xfrm>
           <a:prstGeom prst="line">
             <a:avLst/>
@@ -8779,7 +9392,7 @@
         </p:nvCxnSpPr>
         <p:spPr>
           <a:xfrm>
-            <a:off x="3228975" y="2313801"/>
+            <a:off x="3297555" y="2313801"/>
             <a:ext cx="0" cy="291287"/>
           </a:xfrm>
           <a:prstGeom prst="straightConnector1">
@@ -8815,7 +9428,7 @@
         </p:nvSpPr>
         <p:spPr>
           <a:xfrm>
-            <a:off x="2919412" y="2605088"/>
+            <a:off x="2987992" y="2605088"/>
             <a:ext cx="619125" cy="571500"/>
           </a:xfrm>
           <a:prstGeom prst="can">
@@ -8856,7 +9469,7 @@
         </p:nvSpPr>
         <p:spPr>
           <a:xfrm>
-            <a:off x="2929480" y="2821806"/>
+            <a:off x="2998060" y="2821806"/>
             <a:ext cx="591829" cy="246221"/>
           </a:xfrm>
           <a:prstGeom prst="rect">
@@ -8892,7 +9505,7 @@
         </p:nvSpPr>
         <p:spPr bwMode="auto">
           <a:xfrm>
-            <a:off x="2791605" y="256804"/>
+            <a:off x="2849383" y="193426"/>
             <a:ext cx="890587" cy="531813"/>
           </a:xfrm>
           <a:prstGeom prst="roundRect">
@@ -9050,7 +9663,7 @@
             </a:lvl9pPr>
           </a:lstStyle>
           <a:p>
-            <a:pPr eaLnBrk="1" hangingPunct="1">
+            <a:pPr algn="ctr" eaLnBrk="1" hangingPunct="1">
               <a:spcBef>
                 <a:spcPct val="0"/>
               </a:spcBef>
@@ -9099,15 +9712,15 @@
         <p:nvCxnSpPr>
           <p:cNvPr id="10" name="Straight Connector 9"/>
           <p:cNvCxnSpPr>
-            <a:stCxn id="27" idx="1"/>
+            <a:stCxn id="27" idx="2"/>
             <a:endCxn id="6" idx="0"/>
           </p:cNvCxnSpPr>
           <p:nvPr/>
         </p:nvCxnSpPr>
         <p:spPr>
           <a:xfrm flipH="1">
-            <a:off x="731838" y="522711"/>
-            <a:ext cx="2059767" cy="577433"/>
+            <a:off x="686118" y="725239"/>
+            <a:ext cx="2608559" cy="374905"/>
           </a:xfrm>
           <a:prstGeom prst="line">
             <a:avLst/>
@@ -9132,14 +9745,15 @@
         <p:nvCxnSpPr>
           <p:cNvPr id="12" name="Straight Connector 11"/>
           <p:cNvCxnSpPr>
-            <a:endCxn id="32" idx="0"/>
+            <a:stCxn id="27" idx="2"/>
+            <a:endCxn id="44" idx="0"/>
           </p:cNvCxnSpPr>
           <p:nvPr/>
         </p:nvCxnSpPr>
         <p:spPr>
           <a:xfrm flipH="1">
-            <a:off x="1734335" y="749108"/>
-            <a:ext cx="1083750" cy="351033"/>
+            <a:off x="2418550" y="725239"/>
+            <a:ext cx="876127" cy="370544"/>
           </a:xfrm>
           <a:prstGeom prst="line">
             <a:avLst/>
@@ -9170,9 +9784,9 @@
           <p:nvPr/>
         </p:nvCxnSpPr>
         <p:spPr>
-          <a:xfrm flipH="1">
-            <a:off x="2743204" y="788617"/>
-            <a:ext cx="493695" cy="314709"/>
+          <a:xfrm>
+            <a:off x="3294677" y="725239"/>
+            <a:ext cx="4740" cy="373588"/>
           </a:xfrm>
           <a:prstGeom prst="line">
             <a:avLst/>
@@ -9204,8 +9818,8 @@
         </p:nvCxnSpPr>
         <p:spPr>
           <a:xfrm>
-            <a:off x="3236899" y="788617"/>
-            <a:ext cx="494521" cy="311526"/>
+            <a:off x="3294677" y="725239"/>
+            <a:ext cx="875438" cy="384818"/>
           </a:xfrm>
           <a:prstGeom prst="line">
             <a:avLst/>
@@ -9230,15 +9844,15 @@
         <p:nvCxnSpPr>
           <p:cNvPr id="21" name="Straight Connector 20"/>
           <p:cNvCxnSpPr>
-            <a:stCxn id="27" idx="3"/>
+            <a:stCxn id="27" idx="2"/>
             <a:endCxn id="31" idx="0"/>
           </p:cNvCxnSpPr>
           <p:nvPr/>
         </p:nvCxnSpPr>
         <p:spPr>
           <a:xfrm>
-            <a:off x="3682192" y="522711"/>
-            <a:ext cx="2024852" cy="577430"/>
+            <a:off x="3294677" y="725239"/>
+            <a:ext cx="2667868" cy="374902"/>
           </a:xfrm>
           <a:prstGeom prst="line">
             <a:avLst/>
@@ -9263,14 +9877,15 @@
         <p:nvCxnSpPr>
           <p:cNvPr id="23" name="Straight Connector 22"/>
           <p:cNvCxnSpPr>
+            <a:stCxn id="27" idx="2"/>
             <a:endCxn id="8" idx="0"/>
           </p:cNvCxnSpPr>
           <p:nvPr/>
         </p:nvCxnSpPr>
         <p:spPr>
           <a:xfrm>
-            <a:off x="3655713" y="765808"/>
-            <a:ext cx="1056777" cy="334334"/>
+            <a:off x="3294677" y="725239"/>
+            <a:ext cx="1768172" cy="384818"/>
           </a:xfrm>
           <a:prstGeom prst="line">
             <a:avLst/>
@@ -9285,6 +9900,286 @@
           </a:fillRef>
           <a:effectRef idx="0">
             <a:schemeClr val="accent1"/>
+          </a:effectRef>
+          <a:fontRef idx="minor">
+            <a:schemeClr val="tx1"/>
+          </a:fontRef>
+        </p:style>
+      </p:cxnSp>
+      <p:sp>
+        <p:nvSpPr>
+          <p:cNvPr id="44" name="AutoShape 59"/>
+          <p:cNvSpPr>
+            <a:spLocks noChangeArrowheads="1"/>
+          </p:cNvSpPr>
+          <p:nvPr/>
+        </p:nvSpPr>
+        <p:spPr bwMode="auto">
+          <a:xfrm>
+            <a:off x="2050538" y="1095783"/>
+            <a:ext cx="736023" cy="531813"/>
+          </a:xfrm>
+          <a:prstGeom prst="roundRect">
+            <a:avLst>
+              <a:gd name="adj" fmla="val 16667"/>
+            </a:avLst>
+          </a:prstGeom>
+          <a:solidFill>
+            <a:srgbClr val="C0C0C0"/>
+          </a:solidFill>
+          <a:ln w="9525">
+            <a:solidFill>
+              <a:schemeClr val="tx1"/>
+            </a:solidFill>
+            <a:prstDash val="dash"/>
+            <a:round/>
+            <a:headEnd/>
+            <a:tailEnd/>
+          </a:ln>
+          <a:effectLst/>
+          <a:extLst>
+            <a:ext uri="{AF507438-7753-43E0-B8FC-AC1667EBCBE1}">
+              <a14:hiddenEffects xmlns:a14="http://schemas.microsoft.com/office/drawing/2010/main">
+                <a:effectLst>
+                  <a:outerShdw dist="35921" dir="2700000" algn="ctr" rotWithShape="0">
+                    <a:schemeClr val="bg2"/>
+                  </a:outerShdw>
+                </a:effectLst>
+              </a14:hiddenEffects>
+            </a:ext>
+          </a:extLst>
+        </p:spPr>
+        <p:txBody>
+          <a:bodyPr wrap="none" anchor="ctr"/>
+          <a:lstStyle>
+            <a:lvl1pPr>
+              <a:spcBef>
+                <a:spcPct val="20000"/>
+              </a:spcBef>
+              <a:buChar char="•"/>
+              <a:defRPr sz="1700">
+                <a:solidFill>
+                  <a:schemeClr val="tx1"/>
+                </a:solidFill>
+                <a:latin typeface="Arial" panose="020B0604020202020204" pitchFamily="34" charset="0"/>
+              </a:defRPr>
+            </a:lvl1pPr>
+            <a:lvl2pPr marL="742950" indent="-285750">
+              <a:spcBef>
+                <a:spcPct val="20000"/>
+              </a:spcBef>
+              <a:buChar char="–"/>
+              <a:defRPr sz="1500">
+                <a:solidFill>
+                  <a:schemeClr val="tx1"/>
+                </a:solidFill>
+                <a:latin typeface="Arial" panose="020B0604020202020204" pitchFamily="34" charset="0"/>
+              </a:defRPr>
+            </a:lvl2pPr>
+            <a:lvl3pPr marL="1143000" indent="-228600">
+              <a:spcBef>
+                <a:spcPct val="20000"/>
+              </a:spcBef>
+              <a:buChar char="•"/>
+              <a:defRPr sz="1300">
+                <a:solidFill>
+                  <a:schemeClr val="tx1"/>
+                </a:solidFill>
+                <a:latin typeface="Arial" panose="020B0604020202020204" pitchFamily="34" charset="0"/>
+              </a:defRPr>
+            </a:lvl3pPr>
+            <a:lvl4pPr marL="1600200" indent="-228600">
+              <a:spcBef>
+                <a:spcPct val="20000"/>
+              </a:spcBef>
+              <a:buChar char="–"/>
+              <a:defRPr sz="1100">
+                <a:solidFill>
+                  <a:schemeClr val="tx1"/>
+                </a:solidFill>
+                <a:latin typeface="Arial" panose="020B0604020202020204" pitchFamily="34" charset="0"/>
+              </a:defRPr>
+            </a:lvl4pPr>
+            <a:lvl5pPr marL="2057400" indent="-228600">
+              <a:spcBef>
+                <a:spcPct val="20000"/>
+              </a:spcBef>
+              <a:buChar char="»"/>
+              <a:defRPr sz="1100">
+                <a:solidFill>
+                  <a:schemeClr val="tx1"/>
+                </a:solidFill>
+                <a:latin typeface="Arial" panose="020B0604020202020204" pitchFamily="34" charset="0"/>
+              </a:defRPr>
+            </a:lvl5pPr>
+            <a:lvl6pPr marL="2514600" indent="-228600" eaLnBrk="0" fontAlgn="base" hangingPunct="0">
+              <a:spcBef>
+                <a:spcPct val="20000"/>
+              </a:spcBef>
+              <a:spcAft>
+                <a:spcPct val="0"/>
+              </a:spcAft>
+              <a:buChar char="»"/>
+              <a:defRPr sz="1100">
+                <a:solidFill>
+                  <a:schemeClr val="tx1"/>
+                </a:solidFill>
+                <a:latin typeface="Arial" panose="020B0604020202020204" pitchFamily="34" charset="0"/>
+              </a:defRPr>
+            </a:lvl6pPr>
+            <a:lvl7pPr marL="2971800" indent="-228600" eaLnBrk="0" fontAlgn="base" hangingPunct="0">
+              <a:spcBef>
+                <a:spcPct val="20000"/>
+              </a:spcBef>
+              <a:spcAft>
+                <a:spcPct val="0"/>
+              </a:spcAft>
+              <a:buChar char="»"/>
+              <a:defRPr sz="1100">
+                <a:solidFill>
+                  <a:schemeClr val="tx1"/>
+                </a:solidFill>
+                <a:latin typeface="Arial" panose="020B0604020202020204" pitchFamily="34" charset="0"/>
+              </a:defRPr>
+            </a:lvl7pPr>
+            <a:lvl8pPr marL="3429000" indent="-228600" eaLnBrk="0" fontAlgn="base" hangingPunct="0">
+              <a:spcBef>
+                <a:spcPct val="20000"/>
+              </a:spcBef>
+              <a:spcAft>
+                <a:spcPct val="0"/>
+              </a:spcAft>
+              <a:buChar char="»"/>
+              <a:defRPr sz="1100">
+                <a:solidFill>
+                  <a:schemeClr val="tx1"/>
+                </a:solidFill>
+                <a:latin typeface="Arial" panose="020B0604020202020204" pitchFamily="34" charset="0"/>
+              </a:defRPr>
+            </a:lvl8pPr>
+            <a:lvl9pPr marL="3886200" indent="-228600" eaLnBrk="0" fontAlgn="base" hangingPunct="0">
+              <a:spcBef>
+                <a:spcPct val="20000"/>
+              </a:spcBef>
+              <a:spcAft>
+                <a:spcPct val="0"/>
+              </a:spcAft>
+              <a:buChar char="»"/>
+              <a:defRPr sz="1100">
+                <a:solidFill>
+                  <a:schemeClr val="tx1"/>
+                </a:solidFill>
+                <a:latin typeface="Arial" panose="020B0604020202020204" pitchFamily="34" charset="0"/>
+              </a:defRPr>
+            </a:lvl9pPr>
+          </a:lstStyle>
+          <a:p>
+            <a:pPr algn="ctr" eaLnBrk="1" hangingPunct="1">
+              <a:spcBef>
+                <a:spcPct val="0"/>
+              </a:spcBef>
+              <a:buFontTx/>
+              <a:buNone/>
+            </a:pPr>
+            <a:r>
+              <a:rPr lang="de-DE" altLang="de-DE" sz="800" b="1" dirty="0" err="1" smtClean="0"/>
+              <a:t>oscm</a:t>
+            </a:r>
+            <a:r>
+              <a:rPr lang="de-DE" altLang="de-DE" sz="800" b="1" dirty="0" smtClean="0"/>
+              <a:t>-identity</a:t>
+            </a:r>
+            <a:endParaRPr lang="en-US" altLang="de-DE" sz="800" dirty="0"/>
+          </a:p>
+        </p:txBody>
+      </p:sp>
+      <p:cxnSp>
+        <p:nvCxnSpPr>
+          <p:cNvPr id="51" name="Straight Connector 50"/>
+          <p:cNvCxnSpPr>
+            <a:stCxn id="27" idx="2"/>
+            <a:endCxn id="32" idx="0"/>
+          </p:cNvCxnSpPr>
+          <p:nvPr/>
+        </p:nvCxnSpPr>
+        <p:spPr>
+          <a:xfrm flipH="1">
+            <a:off x="1551422" y="725239"/>
+            <a:ext cx="1743255" cy="369757"/>
+          </a:xfrm>
+          <a:prstGeom prst="line">
+            <a:avLst/>
+          </a:prstGeom>
+        </p:spPr>
+        <p:style>
+          <a:lnRef idx="1">
+            <a:schemeClr val="accent1"/>
+          </a:lnRef>
+          <a:fillRef idx="0">
+            <a:schemeClr val="accent1"/>
+          </a:fillRef>
+          <a:effectRef idx="0">
+            <a:schemeClr val="accent1"/>
+          </a:effectRef>
+          <a:fontRef idx="minor">
+            <a:schemeClr val="tx1"/>
+          </a:fontRef>
+        </p:style>
+      </p:cxnSp>
+      <p:cxnSp>
+        <p:nvCxnSpPr>
+          <p:cNvPr id="57" name="Straight Connector 56"/>
+          <p:cNvCxnSpPr/>
+          <p:nvPr/>
+        </p:nvCxnSpPr>
+        <p:spPr>
+          <a:xfrm>
+            <a:off x="3306194" y="1620850"/>
+            <a:ext cx="1587" cy="230201"/>
+          </a:xfrm>
+          <a:prstGeom prst="line">
+            <a:avLst/>
+          </a:prstGeom>
+        </p:spPr>
+        <p:style>
+          <a:lnRef idx="1">
+            <a:schemeClr val="dk1"/>
+          </a:lnRef>
+          <a:fillRef idx="0">
+            <a:schemeClr val="dk1"/>
+          </a:fillRef>
+          <a:effectRef idx="0">
+            <a:schemeClr val="dk1"/>
+          </a:effectRef>
+          <a:fontRef idx="minor">
+            <a:schemeClr val="tx1"/>
+          </a:fontRef>
+        </p:style>
+      </p:cxnSp>
+      <p:cxnSp>
+        <p:nvCxnSpPr>
+          <p:cNvPr id="58" name="Straight Connector 57"/>
+          <p:cNvCxnSpPr/>
+          <p:nvPr/>
+        </p:nvCxnSpPr>
+        <p:spPr>
+          <a:xfrm>
+            <a:off x="4170114" y="2090079"/>
+            <a:ext cx="1587" cy="230201"/>
+          </a:xfrm>
+          <a:prstGeom prst="line">
+            <a:avLst/>
+          </a:prstGeom>
+        </p:spPr>
+        <p:style>
+          <a:lnRef idx="1">
+            <a:schemeClr val="dk1"/>
+          </a:lnRef>
+          <a:fillRef idx="0">
+            <a:schemeClr val="dk1"/>
+          </a:fillRef>
+          <a:effectRef idx="0">
+            <a:schemeClr val="dk1"/>
           </a:effectRef>
           <a:fontRef idx="minor">
             <a:schemeClr val="tx1"/>

</xml_diff>

<commit_message>
Operator's Guide for review
</commit_message>
<xml_diff>
--- a/Development/DocSources/en/Shared/_images/Containers.pptx
+++ b/Development/DocSources/en/Shared/_images/Containers.pptx
@@ -244,7 +244,7 @@
           <a:p>
             <a:fld id="{0D6885AC-6F9D-4C4F-B990-FB8E98106C15}" type="datetimeFigureOut">
               <a:rPr lang="de-DE" smtClean="0"/>
-              <a:t>14.11.2019</a:t>
+              <a:t>26.11.2019</a:t>
             </a:fld>
             <a:endParaRPr lang="de-DE"/>
           </a:p>
@@ -414,7 +414,7 @@
           <a:p>
             <a:fld id="{0D6885AC-6F9D-4C4F-B990-FB8E98106C15}" type="datetimeFigureOut">
               <a:rPr lang="de-DE" smtClean="0"/>
-              <a:t>14.11.2019</a:t>
+              <a:t>26.11.2019</a:t>
             </a:fld>
             <a:endParaRPr lang="de-DE"/>
           </a:p>
@@ -594,7 +594,7 @@
           <a:p>
             <a:fld id="{0D6885AC-6F9D-4C4F-B990-FB8E98106C15}" type="datetimeFigureOut">
               <a:rPr lang="de-DE" smtClean="0"/>
-              <a:t>14.11.2019</a:t>
+              <a:t>26.11.2019</a:t>
             </a:fld>
             <a:endParaRPr lang="de-DE"/>
           </a:p>
@@ -764,7 +764,7 @@
           <a:p>
             <a:fld id="{0D6885AC-6F9D-4C4F-B990-FB8E98106C15}" type="datetimeFigureOut">
               <a:rPr lang="de-DE" smtClean="0"/>
-              <a:t>14.11.2019</a:t>
+              <a:t>26.11.2019</a:t>
             </a:fld>
             <a:endParaRPr lang="de-DE"/>
           </a:p>
@@ -1010,7 +1010,7 @@
           <a:p>
             <a:fld id="{0D6885AC-6F9D-4C4F-B990-FB8E98106C15}" type="datetimeFigureOut">
               <a:rPr lang="de-DE" smtClean="0"/>
-              <a:t>14.11.2019</a:t>
+              <a:t>26.11.2019</a:t>
             </a:fld>
             <a:endParaRPr lang="de-DE"/>
           </a:p>
@@ -1242,7 +1242,7 @@
           <a:p>
             <a:fld id="{0D6885AC-6F9D-4C4F-B990-FB8E98106C15}" type="datetimeFigureOut">
               <a:rPr lang="de-DE" smtClean="0"/>
-              <a:t>14.11.2019</a:t>
+              <a:t>26.11.2019</a:t>
             </a:fld>
             <a:endParaRPr lang="de-DE"/>
           </a:p>
@@ -1609,7 +1609,7 @@
           <a:p>
             <a:fld id="{0D6885AC-6F9D-4C4F-B990-FB8E98106C15}" type="datetimeFigureOut">
               <a:rPr lang="de-DE" smtClean="0"/>
-              <a:t>14.11.2019</a:t>
+              <a:t>26.11.2019</a:t>
             </a:fld>
             <a:endParaRPr lang="de-DE"/>
           </a:p>
@@ -1727,7 +1727,7 @@
           <a:p>
             <a:fld id="{0D6885AC-6F9D-4C4F-B990-FB8E98106C15}" type="datetimeFigureOut">
               <a:rPr lang="de-DE" smtClean="0"/>
-              <a:t>14.11.2019</a:t>
+              <a:t>26.11.2019</a:t>
             </a:fld>
             <a:endParaRPr lang="de-DE"/>
           </a:p>
@@ -1822,7 +1822,7 @@
           <a:p>
             <a:fld id="{0D6885AC-6F9D-4C4F-B990-FB8E98106C15}" type="datetimeFigureOut">
               <a:rPr lang="de-DE" smtClean="0"/>
-              <a:t>14.11.2019</a:t>
+              <a:t>26.11.2019</a:t>
             </a:fld>
             <a:endParaRPr lang="de-DE"/>
           </a:p>
@@ -2099,7 +2099,7 @@
           <a:p>
             <a:fld id="{0D6885AC-6F9D-4C4F-B990-FB8E98106C15}" type="datetimeFigureOut">
               <a:rPr lang="de-DE" smtClean="0"/>
-              <a:t>14.11.2019</a:t>
+              <a:t>26.11.2019</a:t>
             </a:fld>
             <a:endParaRPr lang="de-DE"/>
           </a:p>
@@ -2352,7 +2352,7 @@
           <a:p>
             <a:fld id="{0D6885AC-6F9D-4C4F-B990-FB8E98106C15}" type="datetimeFigureOut">
               <a:rPr lang="de-DE" smtClean="0"/>
-              <a:t>14.11.2019</a:t>
+              <a:t>26.11.2019</a:t>
             </a:fld>
             <a:endParaRPr lang="de-DE"/>
           </a:p>
@@ -2565,7 +2565,7 @@
           <a:p>
             <a:fld id="{0D6885AC-6F9D-4C4F-B990-FB8E98106C15}" type="datetimeFigureOut">
               <a:rPr lang="de-DE" smtClean="0"/>
-              <a:t>14.11.2019</a:t>
+              <a:t>26.11.2019</a:t>
             </a:fld>
             <a:endParaRPr lang="de-DE"/>
           </a:p>
@@ -7288,10 +7288,9 @@
               <a:buNone/>
             </a:pPr>
             <a:r>
-              <a:rPr lang="de-DE" altLang="de-DE" sz="800" b="1" dirty="0" err="1" smtClean="0"/>
-              <a:t>Authorization</a:t>
-            </a:r>
-            <a:endParaRPr lang="de-DE" altLang="de-DE" sz="800" b="1" dirty="0" smtClean="0"/>
+              <a:rPr lang="de-DE" altLang="de-DE" sz="800" b="1" dirty="0" smtClean="0"/>
+              <a:t>OIDC</a:t>
+            </a:r>
           </a:p>
           <a:p>
             <a:pPr algn="ctr" eaLnBrk="1" hangingPunct="1">
@@ -7303,7 +7302,7 @@
             </a:pPr>
             <a:r>
               <a:rPr lang="de-DE" altLang="de-DE" sz="800" b="1" dirty="0" smtClean="0"/>
-              <a:t>Server</a:t>
+              <a:t>Provider</a:t>
             </a:r>
             <a:endParaRPr lang="en-US" altLang="de-DE" sz="800" dirty="0"/>
           </a:p>
@@ -7387,6 +7386,157 @@
           </a:fontRef>
         </p:style>
       </p:cxnSp>
+      <p:sp>
+        <p:nvSpPr>
+          <p:cNvPr id="65" name="Rectangle 37"/>
+          <p:cNvSpPr>
+            <a:spLocks noChangeArrowheads="1"/>
+          </p:cNvSpPr>
+          <p:nvPr/>
+        </p:nvSpPr>
+        <p:spPr bwMode="auto">
+          <a:xfrm>
+            <a:off x="818914" y="634206"/>
+            <a:ext cx="495300" cy="215900"/>
+          </a:xfrm>
+          <a:prstGeom prst="rect">
+            <a:avLst/>
+          </a:prstGeom>
+          <a:noFill/>
+          <a:ln>
+            <a:noFill/>
+          </a:ln>
+          <a:extLst>
+            <a:ext uri="{909E8E84-426E-40DD-AFC4-6F175D3DCCD1}">
+              <a14:hiddenFill xmlns:a14="http://schemas.microsoft.com/office/drawing/2010/main">
+                <a:solidFill>
+                  <a:srgbClr val="FFFFFF"/>
+                </a:solidFill>
+              </a14:hiddenFill>
+            </a:ext>
+            <a:ext uri="{91240B29-F687-4F45-9708-019B960494DF}">
+              <a14:hiddenLine xmlns:a14="http://schemas.microsoft.com/office/drawing/2010/main" w="9525">
+                <a:solidFill>
+                  <a:srgbClr val="000000"/>
+                </a:solidFill>
+                <a:miter lim="800000"/>
+                <a:headEnd/>
+                <a:tailEnd/>
+              </a14:hiddenLine>
+            </a:ext>
+          </a:extLst>
+        </p:spPr>
+        <p:txBody>
+          <a:bodyPr>
+            <a:spAutoFit/>
+          </a:bodyPr>
+          <a:lstStyle>
+            <a:lvl1pPr>
+              <a:defRPr sz="1000">
+                <a:solidFill>
+                  <a:schemeClr val="tx1"/>
+                </a:solidFill>
+                <a:latin typeface="Arial" panose="020B0604020202020204" pitchFamily="34" charset="0"/>
+              </a:defRPr>
+            </a:lvl1pPr>
+            <a:lvl2pPr marL="742950" indent="-285750">
+              <a:defRPr sz="1000">
+                <a:solidFill>
+                  <a:schemeClr val="tx1"/>
+                </a:solidFill>
+                <a:latin typeface="Arial" panose="020B0604020202020204" pitchFamily="34" charset="0"/>
+              </a:defRPr>
+            </a:lvl2pPr>
+            <a:lvl3pPr marL="1143000" indent="-228600">
+              <a:defRPr sz="1000">
+                <a:solidFill>
+                  <a:schemeClr val="tx1"/>
+                </a:solidFill>
+                <a:latin typeface="Arial" panose="020B0604020202020204" pitchFamily="34" charset="0"/>
+              </a:defRPr>
+            </a:lvl3pPr>
+            <a:lvl4pPr marL="1600200" indent="-228600">
+              <a:defRPr sz="1000">
+                <a:solidFill>
+                  <a:schemeClr val="tx1"/>
+                </a:solidFill>
+                <a:latin typeface="Arial" panose="020B0604020202020204" pitchFamily="34" charset="0"/>
+              </a:defRPr>
+            </a:lvl4pPr>
+            <a:lvl5pPr marL="2057400" indent="-228600">
+              <a:defRPr sz="1000">
+                <a:solidFill>
+                  <a:schemeClr val="tx1"/>
+                </a:solidFill>
+                <a:latin typeface="Arial" panose="020B0604020202020204" pitchFamily="34" charset="0"/>
+              </a:defRPr>
+            </a:lvl5pPr>
+            <a:lvl6pPr marL="2514600" indent="-228600" eaLnBrk="0" fontAlgn="base" hangingPunct="0">
+              <a:spcBef>
+                <a:spcPct val="0"/>
+              </a:spcBef>
+              <a:spcAft>
+                <a:spcPct val="0"/>
+              </a:spcAft>
+              <a:defRPr sz="1000">
+                <a:solidFill>
+                  <a:schemeClr val="tx1"/>
+                </a:solidFill>
+                <a:latin typeface="Arial" panose="020B0604020202020204" pitchFamily="34" charset="0"/>
+              </a:defRPr>
+            </a:lvl6pPr>
+            <a:lvl7pPr marL="2971800" indent="-228600" eaLnBrk="0" fontAlgn="base" hangingPunct="0">
+              <a:spcBef>
+                <a:spcPct val="0"/>
+              </a:spcBef>
+              <a:spcAft>
+                <a:spcPct val="0"/>
+              </a:spcAft>
+              <a:defRPr sz="1000">
+                <a:solidFill>
+                  <a:schemeClr val="tx1"/>
+                </a:solidFill>
+                <a:latin typeface="Arial" panose="020B0604020202020204" pitchFamily="34" charset="0"/>
+              </a:defRPr>
+            </a:lvl7pPr>
+            <a:lvl8pPr marL="3429000" indent="-228600" eaLnBrk="0" fontAlgn="base" hangingPunct="0">
+              <a:spcBef>
+                <a:spcPct val="0"/>
+              </a:spcBef>
+              <a:spcAft>
+                <a:spcPct val="0"/>
+              </a:spcAft>
+              <a:defRPr sz="1000">
+                <a:solidFill>
+                  <a:schemeClr val="tx1"/>
+                </a:solidFill>
+                <a:latin typeface="Arial" panose="020B0604020202020204" pitchFamily="34" charset="0"/>
+              </a:defRPr>
+            </a:lvl8pPr>
+            <a:lvl9pPr marL="3886200" indent="-228600" eaLnBrk="0" fontAlgn="base" hangingPunct="0">
+              <a:spcBef>
+                <a:spcPct val="0"/>
+              </a:spcBef>
+              <a:spcAft>
+                <a:spcPct val="0"/>
+              </a:spcAft>
+              <a:defRPr sz="1000">
+                <a:solidFill>
+                  <a:schemeClr val="tx1"/>
+                </a:solidFill>
+                <a:latin typeface="Arial" panose="020B0604020202020204" pitchFamily="34" charset="0"/>
+              </a:defRPr>
+            </a:lvl9pPr>
+          </a:lstStyle>
+          <a:p>
+            <a:pPr eaLnBrk="1" hangingPunct="1"/>
+            <a:r>
+              <a:rPr lang="de-DE" altLang="de-DE" sz="800" b="1" dirty="0"/>
+              <a:t>http</a:t>
+            </a:r>
+          </a:p>
+        </p:txBody>
+      </p:sp>
     </p:spTree>
     <p:extLst>
       <p:ext uri="{BB962C8B-B14F-4D97-AF65-F5344CB8AC3E}">
@@ -9028,7 +9178,7 @@
         <p:spPr>
           <a:xfrm>
             <a:off x="686118" y="1631957"/>
-            <a:ext cx="1587" cy="230201"/>
+            <a:ext cx="0" cy="216715"/>
           </a:xfrm>
           <a:prstGeom prst="line">
             <a:avLst/>

</xml_diff>